<commit_message>
Alle Daten in die Präsentation eingetragen
PJ_KI_MST2: ist jetzt fertig (hoffe ich)
</commit_message>
<xml_diff>
--- a/PJ_KI_MST2.pptx
+++ b/PJ_KI_MST2.pptx
@@ -11,7 +11,8 @@
     <p:sldId id="266" r:id="rId5"/>
     <p:sldId id="268" r:id="rId6"/>
     <p:sldId id="267" r:id="rId7"/>
-    <p:sldId id="259" r:id="rId8"/>
+    <p:sldId id="269" r:id="rId8"/>
+    <p:sldId id="259" r:id="rId9"/>
   </p:sldIdLst>
   <p:sldSz cx="12192000" cy="6858000"/>
   <p:notesSz cx="6858000" cy="9144000"/>
@@ -265,7 +266,7 @@
           <a:p>
             <a:fld id="{17468778-AD1E-48E6-A1B1-00A628170ED2}" type="datetimeFigureOut">
               <a:rPr lang="de-DE" smtClean="0"/>
-              <a:t>22.05.23</a:t>
+              <a:t>22.05.2023</a:t>
             </a:fld>
             <a:endParaRPr lang="de-DE"/>
           </a:p>
@@ -463,7 +464,7 @@
           <a:p>
             <a:fld id="{17468778-AD1E-48E6-A1B1-00A628170ED2}" type="datetimeFigureOut">
               <a:rPr lang="de-DE" smtClean="0"/>
-              <a:t>22.05.23</a:t>
+              <a:t>22.05.2023</a:t>
             </a:fld>
             <a:endParaRPr lang="de-DE"/>
           </a:p>
@@ -671,7 +672,7 @@
           <a:p>
             <a:fld id="{17468778-AD1E-48E6-A1B1-00A628170ED2}" type="datetimeFigureOut">
               <a:rPr lang="de-DE" smtClean="0"/>
-              <a:t>22.05.23</a:t>
+              <a:t>22.05.2023</a:t>
             </a:fld>
             <a:endParaRPr lang="de-DE"/>
           </a:p>
@@ -869,7 +870,7 @@
           <a:p>
             <a:fld id="{17468778-AD1E-48E6-A1B1-00A628170ED2}" type="datetimeFigureOut">
               <a:rPr lang="de-DE" smtClean="0"/>
-              <a:t>22.05.23</a:t>
+              <a:t>22.05.2023</a:t>
             </a:fld>
             <a:endParaRPr lang="de-DE"/>
           </a:p>
@@ -1144,7 +1145,7 @@
           <a:p>
             <a:fld id="{17468778-AD1E-48E6-A1B1-00A628170ED2}" type="datetimeFigureOut">
               <a:rPr lang="de-DE" smtClean="0"/>
-              <a:t>22.05.23</a:t>
+              <a:t>22.05.2023</a:t>
             </a:fld>
             <a:endParaRPr lang="de-DE"/>
           </a:p>
@@ -1409,7 +1410,7 @@
           <a:p>
             <a:fld id="{17468778-AD1E-48E6-A1B1-00A628170ED2}" type="datetimeFigureOut">
               <a:rPr lang="de-DE" smtClean="0"/>
-              <a:t>22.05.23</a:t>
+              <a:t>22.05.2023</a:t>
             </a:fld>
             <a:endParaRPr lang="de-DE"/>
           </a:p>
@@ -1821,7 +1822,7 @@
           <a:p>
             <a:fld id="{17468778-AD1E-48E6-A1B1-00A628170ED2}" type="datetimeFigureOut">
               <a:rPr lang="de-DE" smtClean="0"/>
-              <a:t>22.05.23</a:t>
+              <a:t>22.05.2023</a:t>
             </a:fld>
             <a:endParaRPr lang="de-DE"/>
           </a:p>
@@ -1962,7 +1963,7 @@
           <a:p>
             <a:fld id="{17468778-AD1E-48E6-A1B1-00A628170ED2}" type="datetimeFigureOut">
               <a:rPr lang="de-DE" smtClean="0"/>
-              <a:t>22.05.23</a:t>
+              <a:t>22.05.2023</a:t>
             </a:fld>
             <a:endParaRPr lang="de-DE"/>
           </a:p>
@@ -2075,7 +2076,7 @@
           <a:p>
             <a:fld id="{17468778-AD1E-48E6-A1B1-00A628170ED2}" type="datetimeFigureOut">
               <a:rPr lang="de-DE" smtClean="0"/>
-              <a:t>22.05.23</a:t>
+              <a:t>22.05.2023</a:t>
             </a:fld>
             <a:endParaRPr lang="de-DE"/>
           </a:p>
@@ -2386,7 +2387,7 @@
           <a:p>
             <a:fld id="{17468778-AD1E-48E6-A1B1-00A628170ED2}" type="datetimeFigureOut">
               <a:rPr lang="de-DE" smtClean="0"/>
-              <a:t>22.05.23</a:t>
+              <a:t>22.05.2023</a:t>
             </a:fld>
             <a:endParaRPr lang="de-DE"/>
           </a:p>
@@ -2674,7 +2675,7 @@
           <a:p>
             <a:fld id="{17468778-AD1E-48E6-A1B1-00A628170ED2}" type="datetimeFigureOut">
               <a:rPr lang="de-DE" smtClean="0"/>
-              <a:t>22.05.23</a:t>
+              <a:t>22.05.2023</a:t>
             </a:fld>
             <a:endParaRPr lang="de-DE"/>
           </a:p>
@@ -2915,7 +2916,7 @@
           <a:p>
             <a:fld id="{17468778-AD1E-48E6-A1B1-00A628170ED2}" type="datetimeFigureOut">
               <a:rPr lang="de-DE" smtClean="0"/>
-              <a:t>22.05.23</a:t>
+              <a:t>22.05.2023</a:t>
             </a:fld>
             <a:endParaRPr lang="de-DE"/>
           </a:p>
@@ -3696,7 +3697,7 @@
           <p:nvPr>
             <p:extLst>
               <p:ext uri="{D42A27DB-BD31-4B8C-83A1-F6EECF244321}">
-                <p14:modId xmlns:p14="http://schemas.microsoft.com/office/powerpoint/2010/main" val="59773669"/>
+                <p14:modId xmlns:p14="http://schemas.microsoft.com/office/powerpoint/2010/main" val="2805396535"/>
               </p:ext>
             </p:extLst>
           </p:nvPr>
@@ -3860,7 +3861,7 @@
                       </a:pPr>
                       <a:r>
                         <a:rPr lang="de-DE" dirty="0"/>
-                        <a:t> 0.010939 ms</a:t>
+                        <a:t> 0,010939ms</a:t>
                       </a:r>
                       <a:endParaRPr lang="de-DE" dirty="0">
                         <a:latin typeface="DM Sans" pitchFamily="2" charset="77"/>
@@ -3881,7 +3882,7 @@
                       </a:pPr>
                       <a:r>
                         <a:rPr lang="de-DE" dirty="0"/>
-                        <a:t>0.010508ms</a:t>
+                        <a:t>0,010508ms</a:t>
                       </a:r>
                       <a:endParaRPr lang="de-DE" dirty="0">
                         <a:latin typeface="DM Sans" pitchFamily="2" charset="77"/>
@@ -3902,7 +3903,7 @@
                       </a:pPr>
                       <a:r>
                         <a:rPr lang="de-DE" dirty="0"/>
-                        <a:t> 0.008228 ms</a:t>
+                        <a:t> 0,008228ms</a:t>
                       </a:r>
                       <a:endParaRPr lang="de-DE" dirty="0">
                         <a:latin typeface="DM Sans" pitchFamily="2" charset="77"/>
@@ -3961,7 +3962,19 @@
                         </a:lnSpc>
                       </a:pPr>
                       <a:r>
-                        <a:rPr lang="de-DE" dirty="0" err="1"/>
+                        <a:rPr lang="de-DE" sz="1800" b="0" i="0" kern="1200" dirty="0">
+                          <a:solidFill>
+                            <a:schemeClr val="dk1"/>
+                          </a:solidFill>
+                          <a:effectLst/>
+                          <a:latin typeface="+mn-lt"/>
+                          <a:ea typeface="+mn-ea"/>
+                          <a:cs typeface="+mn-cs"/>
+                        </a:rPr>
+                        <a:t>0,010986</a:t>
+                      </a:r>
+                      <a:r>
+                        <a:rPr lang="de-DE" dirty="0"/>
                         <a:t>ms</a:t>
                       </a:r>
                       <a:endParaRPr lang="de-DE" dirty="0">
@@ -3976,13 +3989,37 @@
                     <a:bodyPr/>
                     <a:lstStyle/>
                     <a:p>
-                      <a:pPr algn="ctr">
+                      <a:pPr marL="0" marR="0" lvl="0" indent="0" algn="ctr" defTabSz="914400" rtl="0" eaLnBrk="1" fontAlgn="auto" latinLnBrk="0" hangingPunct="1">
                         <a:lnSpc>
                           <a:spcPct val="150000"/>
                         </a:lnSpc>
+                        <a:spcBef>
+                          <a:spcPts val="0"/>
+                        </a:spcBef>
+                        <a:spcAft>
+                          <a:spcPts val="0"/>
+                        </a:spcAft>
+                        <a:buClrTx/>
+                        <a:buSzTx/>
+                        <a:buFontTx/>
+                        <a:buNone/>
+                        <a:tabLst/>
+                        <a:defRPr/>
                       </a:pPr>
                       <a:r>
-                        <a:rPr lang="de-DE" dirty="0" err="1"/>
+                        <a:rPr lang="de-DE" sz="1800" b="0" i="0" kern="1200" dirty="0">
+                          <a:solidFill>
+                            <a:schemeClr val="dk1"/>
+                          </a:solidFill>
+                          <a:effectLst/>
+                          <a:latin typeface="+mn-lt"/>
+                          <a:ea typeface="+mn-ea"/>
+                          <a:cs typeface="+mn-cs"/>
+                        </a:rPr>
+                        <a:t>0,011276</a:t>
+                      </a:r>
+                      <a:r>
+                        <a:rPr lang="de-DE" dirty="0"/>
                         <a:t>ms</a:t>
                       </a:r>
                       <a:endParaRPr lang="de-DE" dirty="0">
@@ -3997,13 +4034,37 @@
                     <a:bodyPr/>
                     <a:lstStyle/>
                     <a:p>
-                      <a:pPr algn="ctr">
+                      <a:pPr marL="0" marR="0" lvl="0" indent="0" algn="ctr" defTabSz="914400" rtl="0" eaLnBrk="1" fontAlgn="auto" latinLnBrk="0" hangingPunct="1">
                         <a:lnSpc>
                           <a:spcPct val="150000"/>
                         </a:lnSpc>
+                        <a:spcBef>
+                          <a:spcPts val="0"/>
+                        </a:spcBef>
+                        <a:spcAft>
+                          <a:spcPts val="0"/>
+                        </a:spcAft>
+                        <a:buClrTx/>
+                        <a:buSzTx/>
+                        <a:buFontTx/>
+                        <a:buNone/>
+                        <a:tabLst/>
+                        <a:defRPr/>
                       </a:pPr>
                       <a:r>
-                        <a:rPr lang="de-DE" dirty="0" err="1"/>
+                        <a:rPr lang="de-DE" sz="1800" b="0" i="0" kern="1200" dirty="0">
+                          <a:solidFill>
+                            <a:schemeClr val="dk1"/>
+                          </a:solidFill>
+                          <a:effectLst/>
+                          <a:latin typeface="+mn-lt"/>
+                          <a:ea typeface="+mn-ea"/>
+                          <a:cs typeface="+mn-cs"/>
+                        </a:rPr>
+                        <a:t>0,00867</a:t>
+                      </a:r>
+                      <a:r>
+                        <a:rPr lang="de-DE" dirty="0"/>
                         <a:t>ms</a:t>
                       </a:r>
                       <a:endParaRPr lang="de-DE" dirty="0">
@@ -4245,7 +4306,7 @@
           <p:nvPr>
             <p:extLst>
               <p:ext uri="{D42A27DB-BD31-4B8C-83A1-F6EECF244321}">
-                <p14:modId xmlns:p14="http://schemas.microsoft.com/office/powerpoint/2010/main" val="1192278293"/>
+                <p14:modId xmlns:p14="http://schemas.microsoft.com/office/powerpoint/2010/main" val="72783194"/>
               </p:ext>
             </p:extLst>
           </p:nvPr>
@@ -4759,7 +4820,7 @@
                       <a:pPr algn="ctr"/>
                       <a:r>
                         <a:rPr lang="de-DE" sz="1200" dirty="0"/>
-                        <a:t>2.257966</a:t>
+                        <a:t>2,257</a:t>
                       </a:r>
                     </a:p>
                   </a:txBody>
@@ -4792,7 +4853,7 @@
                       <a:pPr algn="ctr"/>
                       <a:r>
                         <a:rPr lang="de-DE" sz="1200" dirty="0"/>
-                        <a:t>38.673325</a:t>
+                        <a:t>38,673</a:t>
                       </a:r>
                     </a:p>
                   </a:txBody>
@@ -4834,7 +4895,7 @@
                       <a:pPr algn="ctr"/>
                       <a:r>
                         <a:rPr lang="de-DE" sz="1200" dirty="0"/>
-                        <a:t>609.607391</a:t>
+                        <a:t>609,607</a:t>
                       </a:r>
                     </a:p>
                   </a:txBody>
@@ -5025,7 +5086,7 @@
                       <a:pPr algn="ctr"/>
                       <a:r>
                         <a:rPr lang="de-DE" sz="1200" dirty="0"/>
-                        <a:t>18.549416</a:t>
+                        <a:t>18,549</a:t>
                       </a:r>
                     </a:p>
                   </a:txBody>
@@ -5067,7 +5128,7 @@
                       <a:pPr algn="ctr"/>
                       <a:r>
                         <a:rPr lang="de-DE" sz="1200" dirty="0"/>
-                        <a:t>718.497658 </a:t>
+                        <a:t>718,497 </a:t>
                       </a:r>
                     </a:p>
                   </a:txBody>
@@ -5118,7 +5179,7 @@
                       <a:pPr algn="ctr"/>
                       <a:r>
                         <a:rPr lang="de-DE" sz="1200" dirty="0"/>
-                        <a:t>27461.15875</a:t>
+                        <a:t>27461,158</a:t>
                       </a:r>
                     </a:p>
                   </a:txBody>
@@ -5336,7 +5397,7 @@
                       <a:pPr algn="ctr"/>
                       <a:r>
                         <a:rPr lang="de-DE" sz="1200" dirty="0"/>
-                        <a:t>10.645108</a:t>
+                        <a:t>10,645</a:t>
                       </a:r>
                     </a:p>
                   </a:txBody>
@@ -5369,7 +5430,7 @@
                       <a:pPr algn="ctr"/>
                       <a:r>
                         <a:rPr lang="de-DE" sz="1200" dirty="0"/>
-                        <a:t>325.254425</a:t>
+                        <a:t>325,254</a:t>
                       </a:r>
                     </a:p>
                   </a:txBody>
@@ -5411,7 +5472,7 @@
                       <a:pPr algn="ctr"/>
                       <a:r>
                         <a:rPr lang="de-DE" sz="1200" dirty="0"/>
-                        <a:t>11211.73835</a:t>
+                        <a:t>11211,738</a:t>
                       </a:r>
                     </a:p>
                   </a:txBody>
@@ -5615,7 +5676,7 @@
                       <a:pPr algn="ctr"/>
                       <a:r>
                         <a:rPr lang="de-DE" sz="1200" dirty="0"/>
-                        <a:t>2.33882</a:t>
+                        <a:t>2,338</a:t>
                       </a:r>
                     </a:p>
                   </a:txBody>
@@ -5648,7 +5709,7 @@
                       <a:pPr algn="ctr"/>
                       <a:r>
                         <a:rPr lang="de-DE" sz="1200" dirty="0"/>
-                        <a:t>40.83484</a:t>
+                        <a:t>40,834</a:t>
                       </a:r>
                     </a:p>
                   </a:txBody>
@@ -5690,7 +5751,7 @@
                       <a:pPr algn="ctr"/>
                       <a:r>
                         <a:rPr lang="de-DE" sz="1200" dirty="0"/>
-                        <a:t>661.30738</a:t>
+                        <a:t>661,307</a:t>
                       </a:r>
                     </a:p>
                   </a:txBody>
@@ -5881,7 +5942,7 @@
                       <a:pPr algn="ctr"/>
                       <a:r>
                         <a:rPr lang="de-DE" sz="1200" dirty="0"/>
-                        <a:t>19.11446</a:t>
+                        <a:t>19,114</a:t>
                       </a:r>
                     </a:p>
                   </a:txBody>
@@ -5923,7 +5984,7 @@
                       <a:pPr algn="ctr"/>
                       <a:r>
                         <a:rPr lang="de-DE" sz="1200" dirty="0"/>
-                        <a:t>741.0739</a:t>
+                        <a:t>741,073</a:t>
                       </a:r>
                     </a:p>
                   </a:txBody>
@@ -5974,7 +6035,7 @@
                       <a:pPr algn="ctr"/>
                       <a:r>
                         <a:rPr lang="de-DE" sz="1200" dirty="0"/>
-                        <a:t>29144.52802</a:t>
+                        <a:t>29144,528</a:t>
                       </a:r>
                     </a:p>
                   </a:txBody>
@@ -6192,7 +6253,7 @@
                       <a:pPr algn="ctr"/>
                       <a:r>
                         <a:rPr lang="de-DE" sz="1200" dirty="0"/>
-                        <a:t>10.87954</a:t>
+                        <a:t>10,879</a:t>
                       </a:r>
                     </a:p>
                   </a:txBody>
@@ -6225,7 +6286,7 @@
                       <a:pPr algn="ctr"/>
                       <a:r>
                         <a:rPr lang="de-DE" sz="1200" dirty="0"/>
-                        <a:t>345.7105</a:t>
+                        <a:t>345,710</a:t>
                       </a:r>
                     </a:p>
                   </a:txBody>
@@ -6267,7 +6328,7 @@
                       <a:pPr algn="ctr"/>
                       <a:r>
                         <a:rPr lang="de-DE" sz="1200" dirty="0"/>
-                        <a:t>11527.75996</a:t>
+                        <a:t>11527,759</a:t>
                       </a:r>
                     </a:p>
                   </a:txBody>
@@ -6471,7 +6532,7 @@
                       <a:pPr algn="ctr"/>
                       <a:r>
                         <a:rPr lang="de-DE" sz="1200" dirty="0"/>
-                        <a:t>3.89526</a:t>
+                        <a:t>3,895</a:t>
                       </a:r>
                     </a:p>
                   </a:txBody>
@@ -6504,7 +6565,7 @@
                       <a:pPr algn="ctr"/>
                       <a:r>
                         <a:rPr lang="de-DE" sz="1200" dirty="0"/>
-                        <a:t>62.04666</a:t>
+                        <a:t>62,046</a:t>
                       </a:r>
                     </a:p>
                   </a:txBody>
@@ -6546,7 +6607,7 @@
                       <a:pPr algn="ctr"/>
                       <a:r>
                         <a:rPr lang="de-DE" sz="1200" dirty="0"/>
-                        <a:t>1133.41844</a:t>
+                        <a:t>1133,418</a:t>
                       </a:r>
                     </a:p>
                   </a:txBody>
@@ -6737,7 +6798,7 @@
                       <a:pPr algn="ctr"/>
                       <a:r>
                         <a:rPr lang="de-DE" sz="1200" dirty="0"/>
-                        <a:t>36.07686</a:t>
+                        <a:t>36,076</a:t>
                       </a:r>
                     </a:p>
                   </a:txBody>
@@ -6779,7 +6840,7 @@
                       <a:pPr algn="ctr"/>
                       <a:r>
                         <a:rPr lang="de-DE" sz="1200" dirty="0"/>
-                        <a:t>1304.23974</a:t>
+                        <a:t>1304,239</a:t>
                       </a:r>
                     </a:p>
                   </a:txBody>
@@ -6830,7 +6891,7 @@
                       <a:pPr algn="ctr"/>
                       <a:r>
                         <a:rPr lang="de-DE" sz="1200" dirty="0"/>
-                        <a:t>51436.92228</a:t>
+                        <a:t>51436,922</a:t>
                       </a:r>
                     </a:p>
                   </a:txBody>
@@ -7048,7 +7109,7 @@
                       <a:pPr algn="ctr"/>
                       <a:r>
                         <a:rPr lang="de-DE" sz="1200" dirty="0"/>
-                        <a:t>24.60834</a:t>
+                        <a:t>24,608</a:t>
                       </a:r>
                     </a:p>
                   </a:txBody>
@@ -7081,7 +7142,7 @@
                       <a:pPr algn="ctr"/>
                       <a:r>
                         <a:rPr lang="de-DE" sz="1200" dirty="0"/>
-                        <a:t>587.17426</a:t>
+                        <a:t>587,174</a:t>
                       </a:r>
                     </a:p>
                   </a:txBody>
@@ -7123,7 +7184,7 @@
                       <a:pPr algn="ctr"/>
                       <a:r>
                         <a:rPr lang="de-DE" sz="1200" dirty="0"/>
-                        <a:t>19537.9714</a:t>
+                        <a:t>19537,971</a:t>
                       </a:r>
                     </a:p>
                   </a:txBody>
@@ -7346,7 +7407,7 @@
           <p:nvPr>
             <p:extLst>
               <p:ext uri="{D42A27DB-BD31-4B8C-83A1-F6EECF244321}">
-                <p14:modId xmlns:p14="http://schemas.microsoft.com/office/powerpoint/2010/main" val="72455839"/>
+                <p14:modId xmlns:p14="http://schemas.microsoft.com/office/powerpoint/2010/main" val="7850969"/>
               </p:ext>
             </p:extLst>
           </p:nvPr>
@@ -7860,7 +7921,7 @@
                       <a:pPr algn="ctr"/>
                       <a:r>
                         <a:rPr lang="de-DE" sz="1200" dirty="0"/>
-                        <a:t>3.826</a:t>
+                        <a:t>3,826</a:t>
                       </a:r>
                     </a:p>
                   </a:txBody>
@@ -7893,7 +7954,7 @@
                       <a:pPr algn="ctr"/>
                       <a:r>
                         <a:rPr lang="de-DE" sz="1200" dirty="0"/>
-                        <a:t>11.949</a:t>
+                        <a:t>11,949</a:t>
                       </a:r>
                     </a:p>
                   </a:txBody>
@@ -7935,7 +7996,7 @@
                       <a:pPr algn="ctr"/>
                       <a:r>
                         <a:rPr lang="de-DE" sz="1200" dirty="0"/>
-                        <a:t>98.290</a:t>
+                        <a:t>98,290</a:t>
                       </a:r>
                     </a:p>
                   </a:txBody>
@@ -8126,7 +8187,7 @@
                       <a:pPr algn="ctr"/>
                       <a:r>
                         <a:rPr lang="de-DE" sz="1200" dirty="0"/>
-                        <a:t>10.679</a:t>
+                        <a:t>10,679</a:t>
                       </a:r>
                     </a:p>
                   </a:txBody>
@@ -8168,7 +8229,7 @@
                       <a:pPr algn="ctr"/>
                       <a:r>
                         <a:rPr lang="de-DE" sz="1200" dirty="0"/>
-                        <a:t>242.703</a:t>
+                        <a:t>242,703</a:t>
                       </a:r>
                     </a:p>
                   </a:txBody>
@@ -8219,7 +8280,7 @@
                       <a:pPr algn="ctr"/>
                       <a:r>
                         <a:rPr lang="de-DE" sz="1200" dirty="0"/>
-                        <a:t>4114.663</a:t>
+                        <a:t>4114,663</a:t>
                       </a:r>
                     </a:p>
                   </a:txBody>
@@ -8437,7 +8498,7 @@
                       <a:pPr algn="ctr"/>
                       <a:r>
                         <a:rPr lang="de-DE" sz="1200" dirty="0"/>
-                        <a:t>2.139</a:t>
+                        <a:t>2,139</a:t>
                       </a:r>
                     </a:p>
                   </a:txBody>
@@ -8470,7 +8531,7 @@
                       <a:pPr algn="ctr"/>
                       <a:r>
                         <a:rPr lang="de-DE" sz="1200" dirty="0"/>
-                        <a:t>37.182</a:t>
+                        <a:t>37,182</a:t>
                       </a:r>
                     </a:p>
                   </a:txBody>
@@ -8512,7 +8573,7 @@
                       <a:pPr algn="ctr"/>
                       <a:r>
                         <a:rPr lang="de-DE" sz="1200" dirty="0"/>
-                        <a:t>380.406</a:t>
+                        <a:t>380,406</a:t>
                       </a:r>
                     </a:p>
                   </a:txBody>
@@ -8716,7 +8777,7 @@
                       <a:pPr algn="ctr"/>
                       <a:r>
                         <a:rPr lang="de-DE" sz="1200" dirty="0"/>
-                        <a:t>2.910</a:t>
+                        <a:t>2,910</a:t>
                       </a:r>
                     </a:p>
                   </a:txBody>
@@ -8749,7 +8810,7 @@
                       <a:pPr algn="ctr"/>
                       <a:r>
                         <a:rPr lang="de-DE" sz="1200" dirty="0"/>
-                        <a:t>14.545</a:t>
+                        <a:t>14,545</a:t>
                       </a:r>
                     </a:p>
                   </a:txBody>
@@ -8791,7 +8852,7 @@
                       <a:pPr algn="ctr"/>
                       <a:r>
                         <a:rPr lang="de-DE" sz="1200" dirty="0"/>
-                        <a:t>100.660</a:t>
+                        <a:t>100,660</a:t>
                       </a:r>
                     </a:p>
                   </a:txBody>
@@ -8982,7 +9043,7 @@
                       <a:pPr algn="ctr"/>
                       <a:r>
                         <a:rPr lang="de-DE" sz="1200" dirty="0"/>
-                        <a:t>9.526</a:t>
+                        <a:t>9,526</a:t>
                       </a:r>
                     </a:p>
                   </a:txBody>
@@ -9024,7 +9085,7 @@
                       <a:pPr algn="ctr"/>
                       <a:r>
                         <a:rPr lang="de-DE" sz="1200" dirty="0"/>
-                        <a:t>239.449</a:t>
+                        <a:t>239,449</a:t>
                       </a:r>
                     </a:p>
                   </a:txBody>
@@ -9075,7 +9136,7 @@
                       <a:pPr algn="ctr"/>
                       <a:r>
                         <a:rPr lang="de-DE" sz="1200" dirty="0"/>
-                        <a:t>4300.536</a:t>
+                        <a:t>4300,536</a:t>
                       </a:r>
                     </a:p>
                   </a:txBody>
@@ -9293,7 +9354,7 @@
                       <a:pPr algn="ctr"/>
                       <a:r>
                         <a:rPr lang="de-DE" sz="1200" dirty="0"/>
-                        <a:t>2.273</a:t>
+                        <a:t>2,273</a:t>
                       </a:r>
                     </a:p>
                   </a:txBody>
@@ -9326,7 +9387,7 @@
                       <a:pPr algn="ctr"/>
                       <a:r>
                         <a:rPr lang="de-DE" sz="1200" dirty="0"/>
-                        <a:t>39.678</a:t>
+                        <a:t>39,678</a:t>
                       </a:r>
                     </a:p>
                   </a:txBody>
@@ -9368,7 +9429,7 @@
                       <a:pPr algn="ctr"/>
                       <a:r>
                         <a:rPr lang="de-DE" sz="1200" dirty="0"/>
-                        <a:t>408.472</a:t>
+                        <a:t>408,472</a:t>
                       </a:r>
                     </a:p>
                   </a:txBody>
@@ -12174,14 +12235,14 @@
           <p:nvPr>
             <p:extLst>
               <p:ext uri="{D42A27DB-BD31-4B8C-83A1-F6EECF244321}">
-                <p14:modId xmlns:p14="http://schemas.microsoft.com/office/powerpoint/2010/main" val="2765669063"/>
+                <p14:modId xmlns:p14="http://schemas.microsoft.com/office/powerpoint/2010/main" val="204680224"/>
               </p:ext>
             </p:extLst>
           </p:nvPr>
         </p:nvGraphicFramePr>
         <p:xfrm>
-          <a:off x="1676040" y="1690688"/>
-          <a:ext cx="8839919" cy="4190443"/>
+          <a:off x="1020071" y="2260031"/>
+          <a:ext cx="10151853" cy="3702763"/>
         </p:xfrm>
         <a:graphic>
           <a:graphicData uri="http://schemas.openxmlformats.org/drawingml/2006/table">
@@ -12204,50 +12265,29 @@
                     </a:ext>
                   </a:extLst>
                 </a:gridCol>
-                <a:gridCol w="819725">
+                <a:gridCol w="2183201">
                   <a:extLst>
                     <a:ext uri="{9D8B030D-6E8A-4147-A177-3AD203B41FA5}">
                       <a16:colId xmlns:a16="http://schemas.microsoft.com/office/drawing/2014/main" val="3667442282"/>
                     </a:ext>
                   </a:extLst>
                 </a:gridCol>
-                <a:gridCol w="929640">
+                <a:gridCol w="2294627">
                   <a:extLst>
                     <a:ext uri="{9D8B030D-6E8A-4147-A177-3AD203B41FA5}">
                       <a16:colId xmlns:a16="http://schemas.microsoft.com/office/drawing/2014/main" val="3760187539"/>
                     </a:ext>
                   </a:extLst>
                 </a:gridCol>
-                <a:gridCol w="914400">
+                <a:gridCol w="2432649">
                   <a:extLst>
                     <a:ext uri="{9D8B030D-6E8A-4147-A177-3AD203B41FA5}">
                       <a16:colId xmlns:a16="http://schemas.microsoft.com/office/drawing/2014/main" val="1504315138"/>
                     </a:ext>
                   </a:extLst>
                 </a:gridCol>
-                <a:gridCol w="1005840">
-                  <a:extLst>
-                    <a:ext uri="{9D8B030D-6E8A-4147-A177-3AD203B41FA5}">
-                      <a16:colId xmlns:a16="http://schemas.microsoft.com/office/drawing/2014/main" val="1475980084"/>
-                    </a:ext>
-                  </a:extLst>
-                </a:gridCol>
-                <a:gridCol w="988659">
-                  <a:extLst>
-                    <a:ext uri="{9D8B030D-6E8A-4147-A177-3AD203B41FA5}">
-                      <a16:colId xmlns:a16="http://schemas.microsoft.com/office/drawing/2014/main" val="2013879485"/>
-                    </a:ext>
-                  </a:extLst>
-                </a:gridCol>
-                <a:gridCol w="940279">
-                  <a:extLst>
-                    <a:ext uri="{9D8B030D-6E8A-4147-A177-3AD203B41FA5}">
-                      <a16:colId xmlns:a16="http://schemas.microsoft.com/office/drawing/2014/main" val="183763412"/>
-                    </a:ext>
-                  </a:extLst>
-                </a:gridCol>
               </a:tblGrid>
-              <a:tr h="512409">
+              <a:tr h="0">
                 <a:tc rowSpan="2">
                   <a:txBody>
                     <a:bodyPr/>
@@ -12284,50 +12324,6 @@
                       <a:r>
                         <a:rPr lang="de-DE" sz="1600" dirty="0"/>
                         <a:t>Zeitersparnis durch Cutoff je nach Tiefe d</a:t>
-                      </a:r>
-                    </a:p>
-                  </a:txBody>
-                  <a:tcPr>
-                    <a:lnB w="6350" cap="flat" cmpd="sng" algn="ctr">
-                      <a:solidFill>
-                        <a:schemeClr val="tx1"/>
-                      </a:solidFill>
-                      <a:prstDash val="sysDot"/>
-                      <a:round/>
-                      <a:headEnd type="none" w="med" len="med"/>
-                      <a:tailEnd type="none" w="med" len="med"/>
-                    </a:lnB>
-                  </a:tcPr>
-                </a:tc>
-                <a:tc hMerge="1">
-                  <a:txBody>
-                    <a:bodyPr/>
-                    <a:lstStyle/>
-                    <a:p>
-                      <a:endParaRPr lang="de-DE"/>
-                    </a:p>
-                  </a:txBody>
-                  <a:tcPr/>
-                </a:tc>
-                <a:tc hMerge="1">
-                  <a:txBody>
-                    <a:bodyPr/>
-                    <a:lstStyle/>
-                    <a:p>
-                      <a:endParaRPr lang="de-DE"/>
-                    </a:p>
-                  </a:txBody>
-                  <a:tcPr/>
-                </a:tc>
-                <a:tc gridSpan="3">
-                  <a:txBody>
-                    <a:bodyPr/>
-                    <a:lstStyle/>
-                    <a:p>
-                      <a:pPr algn="ctr"/>
-                      <a:r>
-                        <a:rPr lang="de-DE" sz="1600" dirty="0"/>
-                        <a:t>Gesparte Stellungsuntersuchungen je nach Tiefe d</a:t>
                       </a:r>
                     </a:p>
                   </a:txBody>
@@ -12509,114 +12505,6 @@
                     </a:lnT>
                   </a:tcPr>
                 </a:tc>
-                <a:tc>
-                  <a:txBody>
-                    <a:bodyPr/>
-                    <a:lstStyle/>
-                    <a:p>
-                      <a:pPr algn="ctr"/>
-                      <a:r>
-                        <a:rPr lang="de-DE" sz="1600" dirty="0"/>
-                        <a:t>d = 2</a:t>
-                      </a:r>
-                    </a:p>
-                  </a:txBody>
-                  <a:tcPr>
-                    <a:lnR w="6350" cap="flat" cmpd="sng" algn="ctr">
-                      <a:solidFill>
-                        <a:schemeClr val="tx1"/>
-                      </a:solidFill>
-                      <a:prstDash val="sysDot"/>
-                      <a:round/>
-                      <a:headEnd type="none" w="med" len="med"/>
-                      <a:tailEnd type="none" w="med" len="med"/>
-                    </a:lnR>
-                    <a:lnT w="6350" cap="flat" cmpd="sng" algn="ctr">
-                      <a:solidFill>
-                        <a:schemeClr val="tx1"/>
-                      </a:solidFill>
-                      <a:prstDash val="sysDot"/>
-                      <a:round/>
-                      <a:headEnd type="none" w="med" len="med"/>
-                      <a:tailEnd type="none" w="med" len="med"/>
-                    </a:lnT>
-                  </a:tcPr>
-                </a:tc>
-                <a:tc>
-                  <a:txBody>
-                    <a:bodyPr/>
-                    <a:lstStyle/>
-                    <a:p>
-                      <a:pPr algn="ctr"/>
-                      <a:r>
-                        <a:rPr lang="de-DE" sz="1600" dirty="0"/>
-                        <a:t>d = 3</a:t>
-                      </a:r>
-                    </a:p>
-                  </a:txBody>
-                  <a:tcPr>
-                    <a:lnL w="6350" cap="flat" cmpd="sng" algn="ctr">
-                      <a:solidFill>
-                        <a:schemeClr val="tx1"/>
-                      </a:solidFill>
-                      <a:prstDash val="sysDot"/>
-                      <a:round/>
-                      <a:headEnd type="none" w="med" len="med"/>
-                      <a:tailEnd type="none" w="med" len="med"/>
-                    </a:lnL>
-                    <a:lnR w="6350" cap="flat" cmpd="sng" algn="ctr">
-                      <a:solidFill>
-                        <a:schemeClr val="tx1"/>
-                      </a:solidFill>
-                      <a:prstDash val="sysDot"/>
-                      <a:round/>
-                      <a:headEnd type="none" w="med" len="med"/>
-                      <a:tailEnd type="none" w="med" len="med"/>
-                    </a:lnR>
-                    <a:lnT w="6350" cap="flat" cmpd="sng" algn="ctr">
-                      <a:solidFill>
-                        <a:schemeClr val="tx1"/>
-                      </a:solidFill>
-                      <a:prstDash val="sysDot"/>
-                      <a:round/>
-                      <a:headEnd type="none" w="med" len="med"/>
-                      <a:tailEnd type="none" w="med" len="med"/>
-                    </a:lnT>
-                  </a:tcPr>
-                </a:tc>
-                <a:tc>
-                  <a:txBody>
-                    <a:bodyPr/>
-                    <a:lstStyle/>
-                    <a:p>
-                      <a:pPr algn="ctr"/>
-                      <a:r>
-                        <a:rPr lang="de-DE" sz="1600" dirty="0"/>
-                        <a:t>d = 4</a:t>
-                      </a:r>
-                    </a:p>
-                  </a:txBody>
-                  <a:tcPr>
-                    <a:lnL w="6350" cap="flat" cmpd="sng" algn="ctr">
-                      <a:solidFill>
-                        <a:schemeClr val="tx1"/>
-                      </a:solidFill>
-                      <a:prstDash val="sysDot"/>
-                      <a:round/>
-                      <a:headEnd type="none" w="med" len="med"/>
-                      <a:tailEnd type="none" w="med" len="med"/>
-                    </a:lnL>
-                    <a:lnT w="6350" cap="flat" cmpd="sng" algn="ctr">
-                      <a:solidFill>
-                        <a:schemeClr val="tx1"/>
-                      </a:solidFill>
-                      <a:prstDash val="sysDot"/>
-                      <a:round/>
-                      <a:headEnd type="none" w="med" len="med"/>
-                      <a:tailEnd type="none" w="med" len="med"/>
-                    </a:lnT>
-                  </a:tcPr>
-                </a:tc>
                 <a:extLst>
                   <a:ext uri="{0D108BD9-81ED-4DB2-BD59-A6C34878D82A}">
                     <a16:rowId xmlns:a16="http://schemas.microsoft.com/office/drawing/2014/main" val="2382145308"/>
@@ -12685,8 +12573,35 @@
                     <a:bodyPr/>
                     <a:lstStyle/>
                     <a:p>
-                      <a:pPr algn="ctr"/>
-                      <a:endParaRPr lang="de-DE" sz="1200" dirty="0"/>
+                      <a:pPr marL="0" marR="0" lvl="0" indent="0" algn="ctr" defTabSz="914400" rtl="0" eaLnBrk="1" fontAlgn="auto" latinLnBrk="0" hangingPunct="1">
+                        <a:lnSpc>
+                          <a:spcPct val="100000"/>
+                        </a:lnSpc>
+                        <a:spcBef>
+                          <a:spcPts val="0"/>
+                        </a:spcBef>
+                        <a:spcAft>
+                          <a:spcPts val="0"/>
+                        </a:spcAft>
+                        <a:buClrTx/>
+                        <a:buSzTx/>
+                        <a:buFontTx/>
+                        <a:buNone/>
+                        <a:tabLst/>
+                        <a:defRPr/>
+                      </a:pPr>
+                      <a:r>
+                        <a:rPr lang="de-DE" sz="1600" kern="1200" dirty="0">
+                          <a:solidFill>
+                            <a:schemeClr val="dk1"/>
+                          </a:solidFill>
+                          <a:effectLst/>
+                          <a:latin typeface="+mn-lt"/>
+                          <a:ea typeface="+mn-ea"/>
+                          <a:cs typeface="+mn-cs"/>
+                        </a:rPr>
+                        <a:t>-1,568ms (-69,457%)</a:t>
+                      </a:r>
                     </a:p>
                   </a:txBody>
                   <a:tcPr>
@@ -12715,8 +12630,35 @@
                     <a:bodyPr/>
                     <a:lstStyle/>
                     <a:p>
-                      <a:pPr algn="ctr"/>
-                      <a:endParaRPr lang="de-DE" sz="1200" dirty="0"/>
+                      <a:pPr marL="0" marR="0" lvl="0" indent="0" algn="ctr" defTabSz="914400" rtl="0" eaLnBrk="1" fontAlgn="auto" latinLnBrk="0" hangingPunct="1">
+                        <a:lnSpc>
+                          <a:spcPct val="100000"/>
+                        </a:lnSpc>
+                        <a:spcBef>
+                          <a:spcPts val="0"/>
+                        </a:spcBef>
+                        <a:spcAft>
+                          <a:spcPts val="0"/>
+                        </a:spcAft>
+                        <a:buClrTx/>
+                        <a:buSzTx/>
+                        <a:buFontTx/>
+                        <a:buNone/>
+                        <a:tabLst/>
+                        <a:defRPr/>
+                      </a:pPr>
+                      <a:r>
+                        <a:rPr lang="de-DE" sz="1600" kern="1200" dirty="0">
+                          <a:solidFill>
+                            <a:schemeClr val="dk1"/>
+                          </a:solidFill>
+                          <a:effectLst/>
+                          <a:latin typeface="+mn-lt"/>
+                          <a:ea typeface="+mn-ea"/>
+                          <a:cs typeface="+mn-cs"/>
+                        </a:rPr>
+                        <a:t>26,724ms (69,101%)</a:t>
+                      </a:r>
                     </a:p>
                   </a:txBody>
                   <a:tcPr>
@@ -12754,107 +12696,35 @@
                     <a:bodyPr/>
                     <a:lstStyle/>
                     <a:p>
-                      <a:pPr algn="ctr"/>
-                      <a:endParaRPr lang="de-DE" sz="1200" dirty="0"/>
-                    </a:p>
-                  </a:txBody>
-                  <a:tcPr>
-                    <a:lnL w="6350" cap="flat" cmpd="sng" algn="ctr">
-                      <a:solidFill>
-                        <a:schemeClr val="tx1"/>
-                      </a:solidFill>
-                      <a:prstDash val="sysDot"/>
-                      <a:round/>
-                      <a:headEnd type="none" w="med" len="med"/>
-                      <a:tailEnd type="none" w="med" len="med"/>
-                    </a:lnL>
-                    <a:lnB w="6350" cap="flat" cmpd="sng" algn="ctr">
-                      <a:solidFill>
-                        <a:schemeClr val="tx1"/>
-                      </a:solidFill>
-                      <a:prstDash val="sysDot"/>
-                      <a:round/>
-                      <a:headEnd type="none" w="med" len="med"/>
-                      <a:tailEnd type="none" w="med" len="med"/>
-                    </a:lnB>
-                  </a:tcPr>
-                </a:tc>
-                <a:tc>
-                  <a:txBody>
-                    <a:bodyPr/>
-                    <a:lstStyle/>
-                    <a:p>
-                      <a:pPr algn="ctr"/>
-                      <a:endParaRPr lang="de-DE" sz="1200" dirty="0"/>
-                    </a:p>
-                  </a:txBody>
-                  <a:tcPr>
-                    <a:lnR w="6350" cap="flat" cmpd="sng" algn="ctr">
-                      <a:solidFill>
-                        <a:schemeClr val="tx1"/>
-                      </a:solidFill>
-                      <a:prstDash val="sysDot"/>
-                      <a:round/>
-                      <a:headEnd type="none" w="med" len="med"/>
-                      <a:tailEnd type="none" w="med" len="med"/>
-                    </a:lnR>
-                    <a:lnB w="6350" cap="flat" cmpd="sng" algn="ctr">
-                      <a:solidFill>
-                        <a:schemeClr val="tx1"/>
-                      </a:solidFill>
-                      <a:prstDash val="sysDot"/>
-                      <a:round/>
-                      <a:headEnd type="none" w="med" len="med"/>
-                      <a:tailEnd type="none" w="med" len="med"/>
-                    </a:lnB>
-                  </a:tcPr>
-                </a:tc>
-                <a:tc>
-                  <a:txBody>
-                    <a:bodyPr/>
-                    <a:lstStyle/>
-                    <a:p>
-                      <a:pPr algn="ctr"/>
-                      <a:endParaRPr lang="de-DE" sz="1200" dirty="0"/>
-                    </a:p>
-                  </a:txBody>
-                  <a:tcPr>
-                    <a:lnL w="6350" cap="flat" cmpd="sng" algn="ctr">
-                      <a:solidFill>
-                        <a:schemeClr val="tx1"/>
-                      </a:solidFill>
-                      <a:prstDash val="sysDot"/>
-                      <a:round/>
-                      <a:headEnd type="none" w="med" len="med"/>
-                      <a:tailEnd type="none" w="med" len="med"/>
-                    </a:lnL>
-                    <a:lnR w="6350" cap="flat" cmpd="sng" algn="ctr">
-                      <a:solidFill>
-                        <a:schemeClr val="tx1"/>
-                      </a:solidFill>
-                      <a:prstDash val="sysDot"/>
-                      <a:round/>
-                      <a:headEnd type="none" w="med" len="med"/>
-                      <a:tailEnd type="none" w="med" len="med"/>
-                    </a:lnR>
-                    <a:lnB w="6350" cap="flat" cmpd="sng" algn="ctr">
-                      <a:solidFill>
-                        <a:schemeClr val="tx1"/>
-                      </a:solidFill>
-                      <a:prstDash val="sysDot"/>
-                      <a:round/>
-                      <a:headEnd type="none" w="med" len="med"/>
-                      <a:tailEnd type="none" w="med" len="med"/>
-                    </a:lnB>
-                  </a:tcPr>
-                </a:tc>
-                <a:tc>
-                  <a:txBody>
-                    <a:bodyPr/>
-                    <a:lstStyle/>
-                    <a:p>
-                      <a:pPr algn="ctr"/>
-                      <a:endParaRPr lang="de-DE" sz="1200" dirty="0"/>
+                      <a:pPr marL="0" marR="0" lvl="0" indent="0" algn="ctr" defTabSz="914400" rtl="0" eaLnBrk="1" fontAlgn="auto" latinLnBrk="0" hangingPunct="1">
+                        <a:lnSpc>
+                          <a:spcPct val="100000"/>
+                        </a:lnSpc>
+                        <a:spcBef>
+                          <a:spcPts val="0"/>
+                        </a:spcBef>
+                        <a:spcAft>
+                          <a:spcPts val="0"/>
+                        </a:spcAft>
+                        <a:buClrTx/>
+                        <a:buSzTx/>
+                        <a:buFontTx/>
+                        <a:buNone/>
+                        <a:tabLst/>
+                        <a:defRPr/>
+                      </a:pPr>
+                      <a:r>
+                        <a:rPr lang="de-DE" sz="1600" kern="1200" dirty="0">
+                          <a:solidFill>
+                            <a:schemeClr val="dk1"/>
+                          </a:solidFill>
+                          <a:effectLst/>
+                          <a:latin typeface="+mn-lt"/>
+                          <a:ea typeface="+mn-ea"/>
+                          <a:cs typeface="+mn-cs"/>
+                        </a:rPr>
+                        <a:t>511,316ms (83,876%)</a:t>
+                      </a:r>
                     </a:p>
                   </a:txBody>
                   <a:tcPr>
@@ -12933,8 +12803,35 @@
                     <a:bodyPr/>
                     <a:lstStyle/>
                     <a:p>
-                      <a:pPr algn="ctr"/>
-                      <a:endParaRPr lang="de-DE" sz="1200" dirty="0"/>
+                      <a:pPr marL="0" marR="0" lvl="0" indent="0" algn="ctr" defTabSz="914400" rtl="0" eaLnBrk="1" fontAlgn="auto" latinLnBrk="0" hangingPunct="1">
+                        <a:lnSpc>
+                          <a:spcPct val="100000"/>
+                        </a:lnSpc>
+                        <a:spcBef>
+                          <a:spcPts val="0"/>
+                        </a:spcBef>
+                        <a:spcAft>
+                          <a:spcPts val="0"/>
+                        </a:spcAft>
+                        <a:buClrTx/>
+                        <a:buSzTx/>
+                        <a:buFontTx/>
+                        <a:buNone/>
+                        <a:tabLst/>
+                        <a:defRPr/>
+                      </a:pPr>
+                      <a:r>
+                        <a:rPr lang="de-DE" sz="1600" kern="1200" dirty="0">
+                          <a:solidFill>
+                            <a:schemeClr val="dk1"/>
+                          </a:solidFill>
+                          <a:effectLst/>
+                          <a:latin typeface="+mn-lt"/>
+                          <a:ea typeface="+mn-ea"/>
+                          <a:cs typeface="+mn-cs"/>
+                        </a:rPr>
+                        <a:t>7,870ms (42,427%)</a:t>
+                      </a:r>
                     </a:p>
                   </a:txBody>
                   <a:tcPr>
@@ -12972,8 +12869,35 @@
                     <a:bodyPr/>
                     <a:lstStyle/>
                     <a:p>
-                      <a:pPr algn="ctr"/>
-                      <a:endParaRPr lang="de-DE" sz="1200" dirty="0"/>
+                      <a:pPr marL="0" marR="0" lvl="0" indent="0" algn="ctr" defTabSz="914400" rtl="0" eaLnBrk="1" fontAlgn="auto" latinLnBrk="0" hangingPunct="1">
+                        <a:lnSpc>
+                          <a:spcPct val="100000"/>
+                        </a:lnSpc>
+                        <a:spcBef>
+                          <a:spcPts val="0"/>
+                        </a:spcBef>
+                        <a:spcAft>
+                          <a:spcPts val="0"/>
+                        </a:spcAft>
+                        <a:buClrTx/>
+                        <a:buSzTx/>
+                        <a:buFontTx/>
+                        <a:buNone/>
+                        <a:tabLst/>
+                        <a:defRPr/>
+                      </a:pPr>
+                      <a:r>
+                        <a:rPr lang="de-DE" sz="1600" kern="1200" dirty="0">
+                          <a:solidFill>
+                            <a:schemeClr val="dk1"/>
+                          </a:solidFill>
+                          <a:effectLst/>
+                          <a:latin typeface="+mn-lt"/>
+                          <a:ea typeface="+mn-ea"/>
+                          <a:cs typeface="+mn-cs"/>
+                        </a:rPr>
+                        <a:t>475,794ms (66,221%)</a:t>
+                      </a:r>
                     </a:p>
                   </a:txBody>
                   <a:tcPr>
@@ -13020,134 +12944,35 @@
                     <a:bodyPr/>
                     <a:lstStyle/>
                     <a:p>
-                      <a:pPr algn="ctr"/>
-                      <a:endParaRPr lang="de-DE" sz="1200" dirty="0"/>
-                    </a:p>
-                  </a:txBody>
-                  <a:tcPr>
-                    <a:lnL w="6350" cap="flat" cmpd="sng" algn="ctr">
-                      <a:solidFill>
-                        <a:schemeClr val="tx1"/>
-                      </a:solidFill>
-                      <a:prstDash val="sysDot"/>
-                      <a:round/>
-                      <a:headEnd type="none" w="med" len="med"/>
-                      <a:tailEnd type="none" w="med" len="med"/>
-                    </a:lnL>
-                    <a:lnT w="6350" cap="flat" cmpd="sng" algn="ctr">
-                      <a:solidFill>
-                        <a:schemeClr val="tx1"/>
-                      </a:solidFill>
-                      <a:prstDash val="sysDot"/>
-                      <a:round/>
-                      <a:headEnd type="none" w="med" len="med"/>
-                      <a:tailEnd type="none" w="med" len="med"/>
-                    </a:lnT>
-                    <a:lnB w="6350" cap="flat" cmpd="sng" algn="ctr">
-                      <a:solidFill>
-                        <a:schemeClr val="tx1"/>
-                      </a:solidFill>
-                      <a:prstDash val="sysDot"/>
-                      <a:round/>
-                      <a:headEnd type="none" w="med" len="med"/>
-                      <a:tailEnd type="none" w="med" len="med"/>
-                    </a:lnB>
-                  </a:tcPr>
-                </a:tc>
-                <a:tc>
-                  <a:txBody>
-                    <a:bodyPr/>
-                    <a:lstStyle/>
-                    <a:p>
-                      <a:pPr algn="ctr"/>
-                      <a:endParaRPr lang="de-DE" sz="1200" dirty="0"/>
-                    </a:p>
-                  </a:txBody>
-                  <a:tcPr>
-                    <a:lnR w="6350" cap="flat" cmpd="sng" algn="ctr">
-                      <a:solidFill>
-                        <a:schemeClr val="tx1"/>
-                      </a:solidFill>
-                      <a:prstDash val="sysDot"/>
-                      <a:round/>
-                      <a:headEnd type="none" w="med" len="med"/>
-                      <a:tailEnd type="none" w="med" len="med"/>
-                    </a:lnR>
-                    <a:lnT w="6350" cap="flat" cmpd="sng" algn="ctr">
-                      <a:solidFill>
-                        <a:schemeClr val="tx1"/>
-                      </a:solidFill>
-                      <a:prstDash val="sysDot"/>
-                      <a:round/>
-                      <a:headEnd type="none" w="med" len="med"/>
-                      <a:tailEnd type="none" w="med" len="med"/>
-                    </a:lnT>
-                    <a:lnB w="6350" cap="flat" cmpd="sng" algn="ctr">
-                      <a:solidFill>
-                        <a:schemeClr val="tx1"/>
-                      </a:solidFill>
-                      <a:prstDash val="sysDot"/>
-                      <a:round/>
-                      <a:headEnd type="none" w="med" len="med"/>
-                      <a:tailEnd type="none" w="med" len="med"/>
-                    </a:lnB>
-                  </a:tcPr>
-                </a:tc>
-                <a:tc>
-                  <a:txBody>
-                    <a:bodyPr/>
-                    <a:lstStyle/>
-                    <a:p>
-                      <a:pPr algn="ctr"/>
-                      <a:endParaRPr lang="de-DE" sz="1200" dirty="0"/>
-                    </a:p>
-                  </a:txBody>
-                  <a:tcPr>
-                    <a:lnL w="6350" cap="flat" cmpd="sng" algn="ctr">
-                      <a:solidFill>
-                        <a:schemeClr val="tx1"/>
-                      </a:solidFill>
-                      <a:prstDash val="sysDot"/>
-                      <a:round/>
-                      <a:headEnd type="none" w="med" len="med"/>
-                      <a:tailEnd type="none" w="med" len="med"/>
-                    </a:lnL>
-                    <a:lnR w="6350" cap="flat" cmpd="sng" algn="ctr">
-                      <a:solidFill>
-                        <a:schemeClr val="tx1"/>
-                      </a:solidFill>
-                      <a:prstDash val="sysDot"/>
-                      <a:round/>
-                      <a:headEnd type="none" w="med" len="med"/>
-                      <a:tailEnd type="none" w="med" len="med"/>
-                    </a:lnR>
-                    <a:lnT w="6350" cap="flat" cmpd="sng" algn="ctr">
-                      <a:solidFill>
-                        <a:schemeClr val="tx1"/>
-                      </a:solidFill>
-                      <a:prstDash val="sysDot"/>
-                      <a:round/>
-                      <a:headEnd type="none" w="med" len="med"/>
-                      <a:tailEnd type="none" w="med" len="med"/>
-                    </a:lnT>
-                    <a:lnB w="6350" cap="flat" cmpd="sng" algn="ctr">
-                      <a:solidFill>
-                        <a:schemeClr val="tx1"/>
-                      </a:solidFill>
-                      <a:prstDash val="sysDot"/>
-                      <a:round/>
-                      <a:headEnd type="none" w="med" len="med"/>
-                      <a:tailEnd type="none" w="med" len="med"/>
-                    </a:lnB>
-                  </a:tcPr>
-                </a:tc>
-                <a:tc>
-                  <a:txBody>
-                    <a:bodyPr/>
-                    <a:lstStyle/>
-                    <a:p>
-                      <a:pPr algn="ctr"/>
-                      <a:endParaRPr lang="de-DE" sz="1200" dirty="0"/>
+                      <a:pPr marL="0" marR="0" lvl="0" indent="0" algn="ctr" defTabSz="914400" rtl="0" eaLnBrk="1" fontAlgn="auto" latinLnBrk="0" hangingPunct="1">
+                        <a:lnSpc>
+                          <a:spcPct val="100000"/>
+                        </a:lnSpc>
+                        <a:spcBef>
+                          <a:spcPts val="0"/>
+                        </a:spcBef>
+                        <a:spcAft>
+                          <a:spcPts val="0"/>
+                        </a:spcAft>
+                        <a:buClrTx/>
+                        <a:buSzTx/>
+                        <a:buFontTx/>
+                        <a:buNone/>
+                        <a:tabLst/>
+                        <a:defRPr/>
+                      </a:pPr>
+                      <a:r>
+                        <a:rPr lang="de-DE" sz="1600" kern="1200" dirty="0">
+                          <a:solidFill>
+                            <a:schemeClr val="dk1"/>
+                          </a:solidFill>
+                          <a:effectLst/>
+                          <a:latin typeface="+mn-lt"/>
+                          <a:ea typeface="+mn-ea"/>
+                          <a:cs typeface="+mn-cs"/>
+                        </a:rPr>
+                        <a:t>23346,495ms (85,016%)</a:t>
+                      </a:r>
                     </a:p>
                   </a:txBody>
                   <a:tcPr>
@@ -13226,8 +13051,35 @@
                     <a:bodyPr/>
                     <a:lstStyle/>
                     <a:p>
-                      <a:pPr algn="ctr"/>
-                      <a:endParaRPr lang="de-DE" sz="1200" dirty="0"/>
+                      <a:pPr marL="0" marR="0" lvl="0" indent="0" algn="ctr" defTabSz="914400" rtl="0" eaLnBrk="1" fontAlgn="auto" latinLnBrk="0" hangingPunct="1">
+                        <a:lnSpc>
+                          <a:spcPct val="100000"/>
+                        </a:lnSpc>
+                        <a:spcBef>
+                          <a:spcPts val="0"/>
+                        </a:spcBef>
+                        <a:spcAft>
+                          <a:spcPts val="0"/>
+                        </a:spcAft>
+                        <a:buClrTx/>
+                        <a:buSzTx/>
+                        <a:buFontTx/>
+                        <a:buNone/>
+                        <a:tabLst/>
+                        <a:defRPr/>
+                      </a:pPr>
+                      <a:r>
+                        <a:rPr lang="de-DE" sz="1600" kern="1200" dirty="0">
+                          <a:solidFill>
+                            <a:schemeClr val="dk1"/>
+                          </a:solidFill>
+                          <a:effectLst/>
+                          <a:latin typeface="+mn-lt"/>
+                          <a:ea typeface="+mn-ea"/>
+                          <a:cs typeface="+mn-cs"/>
+                        </a:rPr>
+                        <a:t>8,506ms (79,905%)</a:t>
+                      </a:r>
                     </a:p>
                   </a:txBody>
                   <a:tcPr>
@@ -13256,8 +13108,35 @@
                     <a:bodyPr/>
                     <a:lstStyle/>
                     <a:p>
-                      <a:pPr algn="ctr"/>
-                      <a:endParaRPr lang="de-DE" sz="1200" dirty="0"/>
+                      <a:pPr marL="0" marR="0" lvl="0" indent="0" algn="ctr" defTabSz="914400" rtl="0" eaLnBrk="1" fontAlgn="auto" latinLnBrk="0" hangingPunct="1">
+                        <a:lnSpc>
+                          <a:spcPct val="100000"/>
+                        </a:lnSpc>
+                        <a:spcBef>
+                          <a:spcPts val="0"/>
+                        </a:spcBef>
+                        <a:spcAft>
+                          <a:spcPts val="0"/>
+                        </a:spcAft>
+                        <a:buClrTx/>
+                        <a:buSzTx/>
+                        <a:buFontTx/>
+                        <a:buNone/>
+                        <a:tabLst/>
+                        <a:defRPr/>
+                      </a:pPr>
+                      <a:r>
+                        <a:rPr lang="de-DE" sz="1600" kern="1200" dirty="0">
+                          <a:solidFill>
+                            <a:schemeClr val="dk1"/>
+                          </a:solidFill>
+                          <a:effectLst/>
+                          <a:latin typeface="+mn-lt"/>
+                          <a:ea typeface="+mn-ea"/>
+                          <a:cs typeface="+mn-cs"/>
+                        </a:rPr>
+                        <a:t>288,072ms (88,568%)</a:t>
+                      </a:r>
                     </a:p>
                   </a:txBody>
                   <a:tcPr>
@@ -13295,107 +13174,35 @@
                     <a:bodyPr/>
                     <a:lstStyle/>
                     <a:p>
-                      <a:pPr algn="ctr"/>
-                      <a:endParaRPr lang="de-DE" sz="1200" dirty="0"/>
-                    </a:p>
-                  </a:txBody>
-                  <a:tcPr>
-                    <a:lnL w="6350" cap="flat" cmpd="sng" algn="ctr">
-                      <a:solidFill>
-                        <a:schemeClr val="tx1"/>
-                      </a:solidFill>
-                      <a:prstDash val="sysDot"/>
-                      <a:round/>
-                      <a:headEnd type="none" w="med" len="med"/>
-                      <a:tailEnd type="none" w="med" len="med"/>
-                    </a:lnL>
-                    <a:lnT w="6350" cap="flat" cmpd="sng" algn="ctr">
-                      <a:solidFill>
-                        <a:schemeClr val="tx1"/>
-                      </a:solidFill>
-                      <a:prstDash val="sysDot"/>
-                      <a:round/>
-                      <a:headEnd type="none" w="med" len="med"/>
-                      <a:tailEnd type="none" w="med" len="med"/>
-                    </a:lnT>
-                  </a:tcPr>
-                </a:tc>
-                <a:tc>
-                  <a:txBody>
-                    <a:bodyPr/>
-                    <a:lstStyle/>
-                    <a:p>
-                      <a:pPr algn="ctr"/>
-                      <a:endParaRPr lang="de-DE" sz="1200" dirty="0"/>
-                    </a:p>
-                  </a:txBody>
-                  <a:tcPr>
-                    <a:lnR w="6350" cap="flat" cmpd="sng" algn="ctr">
-                      <a:solidFill>
-                        <a:schemeClr val="tx1"/>
-                      </a:solidFill>
-                      <a:prstDash val="sysDot"/>
-                      <a:round/>
-                      <a:headEnd type="none" w="med" len="med"/>
-                      <a:tailEnd type="none" w="med" len="med"/>
-                    </a:lnR>
-                    <a:lnT w="6350" cap="flat" cmpd="sng" algn="ctr">
-                      <a:solidFill>
-                        <a:schemeClr val="tx1"/>
-                      </a:solidFill>
-                      <a:prstDash val="sysDot"/>
-                      <a:round/>
-                      <a:headEnd type="none" w="med" len="med"/>
-                      <a:tailEnd type="none" w="med" len="med"/>
-                    </a:lnT>
-                  </a:tcPr>
-                </a:tc>
-                <a:tc>
-                  <a:txBody>
-                    <a:bodyPr/>
-                    <a:lstStyle/>
-                    <a:p>
-                      <a:pPr algn="ctr"/>
-                      <a:endParaRPr lang="de-DE" sz="1200" dirty="0"/>
-                    </a:p>
-                  </a:txBody>
-                  <a:tcPr>
-                    <a:lnL w="6350" cap="flat" cmpd="sng" algn="ctr">
-                      <a:solidFill>
-                        <a:schemeClr val="tx1"/>
-                      </a:solidFill>
-                      <a:prstDash val="sysDot"/>
-                      <a:round/>
-                      <a:headEnd type="none" w="med" len="med"/>
-                      <a:tailEnd type="none" w="med" len="med"/>
-                    </a:lnL>
-                    <a:lnR w="6350" cap="flat" cmpd="sng" algn="ctr">
-                      <a:solidFill>
-                        <a:schemeClr val="tx1"/>
-                      </a:solidFill>
-                      <a:prstDash val="sysDot"/>
-                      <a:round/>
-                      <a:headEnd type="none" w="med" len="med"/>
-                      <a:tailEnd type="none" w="med" len="med"/>
-                    </a:lnR>
-                    <a:lnT w="6350" cap="flat" cmpd="sng" algn="ctr">
-                      <a:solidFill>
-                        <a:schemeClr val="tx1"/>
-                      </a:solidFill>
-                      <a:prstDash val="sysDot"/>
-                      <a:round/>
-                      <a:headEnd type="none" w="med" len="med"/>
-                      <a:tailEnd type="none" w="med" len="med"/>
-                    </a:lnT>
-                  </a:tcPr>
-                </a:tc>
-                <a:tc>
-                  <a:txBody>
-                    <a:bodyPr/>
-                    <a:lstStyle/>
-                    <a:p>
-                      <a:pPr algn="ctr"/>
-                      <a:endParaRPr lang="de-DE" sz="1200" dirty="0"/>
+                      <a:pPr marL="0" marR="0" lvl="0" indent="0" algn="ctr" defTabSz="914400" rtl="0" eaLnBrk="1" fontAlgn="auto" latinLnBrk="0" hangingPunct="1">
+                        <a:lnSpc>
+                          <a:spcPct val="100000"/>
+                        </a:lnSpc>
+                        <a:spcBef>
+                          <a:spcPts val="0"/>
+                        </a:spcBef>
+                        <a:spcAft>
+                          <a:spcPts val="0"/>
+                        </a:spcAft>
+                        <a:buClrTx/>
+                        <a:buSzTx/>
+                        <a:buFontTx/>
+                        <a:buNone/>
+                        <a:tabLst/>
+                        <a:defRPr/>
+                      </a:pPr>
+                      <a:r>
+                        <a:rPr lang="de-DE" sz="1600" kern="1200" dirty="0">
+                          <a:solidFill>
+                            <a:schemeClr val="dk1"/>
+                          </a:solidFill>
+                          <a:effectLst/>
+                          <a:latin typeface="+mn-lt"/>
+                          <a:ea typeface="+mn-ea"/>
+                          <a:cs typeface="+mn-cs"/>
+                        </a:rPr>
+                        <a:t>10831,332ms (96,607%)</a:t>
+                      </a:r>
                     </a:p>
                   </a:txBody>
                   <a:tcPr>
@@ -13487,8 +13294,35 @@
                     <a:bodyPr/>
                     <a:lstStyle/>
                     <a:p>
-                      <a:pPr algn="ctr"/>
-                      <a:endParaRPr lang="de-DE" sz="1200" dirty="0"/>
+                      <a:pPr marL="0" marR="0" lvl="0" indent="0" algn="ctr" defTabSz="914400" rtl="0" eaLnBrk="1" fontAlgn="auto" latinLnBrk="0" hangingPunct="1">
+                        <a:lnSpc>
+                          <a:spcPct val="100000"/>
+                        </a:lnSpc>
+                        <a:spcBef>
+                          <a:spcPts val="0"/>
+                        </a:spcBef>
+                        <a:spcAft>
+                          <a:spcPts val="0"/>
+                        </a:spcAft>
+                        <a:buClrTx/>
+                        <a:buSzTx/>
+                        <a:buFontTx/>
+                        <a:buNone/>
+                        <a:tabLst/>
+                        <a:defRPr/>
+                      </a:pPr>
+                      <a:r>
+                        <a:rPr lang="de-DE" sz="1600" kern="1200" dirty="0">
+                          <a:solidFill>
+                            <a:schemeClr val="dk1"/>
+                          </a:solidFill>
+                          <a:effectLst/>
+                          <a:latin typeface="+mn-lt"/>
+                          <a:ea typeface="+mn-ea"/>
+                          <a:cs typeface="+mn-cs"/>
+                        </a:rPr>
+                        <a:t>-0,572ms (-24,459%)</a:t>
+                      </a:r>
                     </a:p>
                   </a:txBody>
                   <a:tcPr>
@@ -13517,8 +13351,35 @@
                     <a:bodyPr/>
                     <a:lstStyle/>
                     <a:p>
-                      <a:pPr algn="ctr"/>
-                      <a:endParaRPr lang="de-DE" sz="1200" dirty="0"/>
+                      <a:pPr marL="0" marR="0" lvl="0" indent="0" algn="ctr" defTabSz="914400" rtl="0" eaLnBrk="1" fontAlgn="auto" latinLnBrk="0" hangingPunct="1">
+                        <a:lnSpc>
+                          <a:spcPct val="100000"/>
+                        </a:lnSpc>
+                        <a:spcBef>
+                          <a:spcPts val="0"/>
+                        </a:spcBef>
+                        <a:spcAft>
+                          <a:spcPts val="0"/>
+                        </a:spcAft>
+                        <a:buClrTx/>
+                        <a:buSzTx/>
+                        <a:buFontTx/>
+                        <a:buNone/>
+                        <a:tabLst/>
+                        <a:defRPr/>
+                      </a:pPr>
+                      <a:r>
+                        <a:rPr lang="de-DE" sz="1600" kern="1200" dirty="0">
+                          <a:solidFill>
+                            <a:schemeClr val="dk1"/>
+                          </a:solidFill>
+                          <a:effectLst/>
+                          <a:latin typeface="+mn-lt"/>
+                          <a:ea typeface="+mn-ea"/>
+                          <a:cs typeface="+mn-cs"/>
+                        </a:rPr>
+                        <a:t>26,289ms (64,379%)</a:t>
+                      </a:r>
                     </a:p>
                   </a:txBody>
                   <a:tcPr>
@@ -13556,107 +13417,35 @@
                     <a:bodyPr/>
                     <a:lstStyle/>
                     <a:p>
-                      <a:pPr algn="ctr"/>
-                      <a:endParaRPr lang="de-DE" sz="1200" dirty="0"/>
-                    </a:p>
-                  </a:txBody>
-                  <a:tcPr>
-                    <a:lnL w="6350" cap="flat" cmpd="sng" algn="ctr">
-                      <a:solidFill>
-                        <a:schemeClr val="tx1"/>
-                      </a:solidFill>
-                      <a:prstDash val="sysDot"/>
-                      <a:round/>
-                      <a:headEnd type="none" w="med" len="med"/>
-                      <a:tailEnd type="none" w="med" len="med"/>
-                    </a:lnL>
-                    <a:lnB w="6350" cap="flat" cmpd="sng" algn="ctr">
-                      <a:solidFill>
-                        <a:schemeClr val="tx1"/>
-                      </a:solidFill>
-                      <a:prstDash val="sysDot"/>
-                      <a:round/>
-                      <a:headEnd type="none" w="med" len="med"/>
-                      <a:tailEnd type="none" w="med" len="med"/>
-                    </a:lnB>
-                  </a:tcPr>
-                </a:tc>
-                <a:tc>
-                  <a:txBody>
-                    <a:bodyPr/>
-                    <a:lstStyle/>
-                    <a:p>
-                      <a:pPr algn="ctr"/>
-                      <a:endParaRPr lang="de-DE" sz="1200" dirty="0"/>
-                    </a:p>
-                  </a:txBody>
-                  <a:tcPr>
-                    <a:lnR w="6350" cap="flat" cmpd="sng" algn="ctr">
-                      <a:solidFill>
-                        <a:schemeClr val="tx1"/>
-                      </a:solidFill>
-                      <a:prstDash val="sysDot"/>
-                      <a:round/>
-                      <a:headEnd type="none" w="med" len="med"/>
-                      <a:tailEnd type="none" w="med" len="med"/>
-                    </a:lnR>
-                    <a:lnB w="6350" cap="flat" cmpd="sng" algn="ctr">
-                      <a:solidFill>
-                        <a:schemeClr val="tx1"/>
-                      </a:solidFill>
-                      <a:prstDash val="sysDot"/>
-                      <a:round/>
-                      <a:headEnd type="none" w="med" len="med"/>
-                      <a:tailEnd type="none" w="med" len="med"/>
-                    </a:lnB>
-                  </a:tcPr>
-                </a:tc>
-                <a:tc>
-                  <a:txBody>
-                    <a:bodyPr/>
-                    <a:lstStyle/>
-                    <a:p>
-                      <a:pPr algn="ctr"/>
-                      <a:endParaRPr lang="de-DE" sz="1200" dirty="0"/>
-                    </a:p>
-                  </a:txBody>
-                  <a:tcPr>
-                    <a:lnL w="6350" cap="flat" cmpd="sng" algn="ctr">
-                      <a:solidFill>
-                        <a:schemeClr val="tx1"/>
-                      </a:solidFill>
-                      <a:prstDash val="sysDot"/>
-                      <a:round/>
-                      <a:headEnd type="none" w="med" len="med"/>
-                      <a:tailEnd type="none" w="med" len="med"/>
-                    </a:lnL>
-                    <a:lnR w="6350" cap="flat" cmpd="sng" algn="ctr">
-                      <a:solidFill>
-                        <a:schemeClr val="tx1"/>
-                      </a:solidFill>
-                      <a:prstDash val="sysDot"/>
-                      <a:round/>
-                      <a:headEnd type="none" w="med" len="med"/>
-                      <a:tailEnd type="none" w="med" len="med"/>
-                    </a:lnR>
-                    <a:lnB w="6350" cap="flat" cmpd="sng" algn="ctr">
-                      <a:solidFill>
-                        <a:schemeClr val="tx1"/>
-                      </a:solidFill>
-                      <a:prstDash val="sysDot"/>
-                      <a:round/>
-                      <a:headEnd type="none" w="med" len="med"/>
-                      <a:tailEnd type="none" w="med" len="med"/>
-                    </a:lnB>
-                  </a:tcPr>
-                </a:tc>
-                <a:tc>
-                  <a:txBody>
-                    <a:bodyPr/>
-                    <a:lstStyle/>
-                    <a:p>
-                      <a:pPr algn="ctr"/>
-                      <a:endParaRPr lang="de-DE" sz="1200" dirty="0"/>
+                      <a:pPr marL="0" marR="0" lvl="0" indent="0" algn="ctr" defTabSz="914400" rtl="0" eaLnBrk="1" fontAlgn="auto" latinLnBrk="0" hangingPunct="1">
+                        <a:lnSpc>
+                          <a:spcPct val="100000"/>
+                        </a:lnSpc>
+                        <a:spcBef>
+                          <a:spcPts val="0"/>
+                        </a:spcBef>
+                        <a:spcAft>
+                          <a:spcPts val="0"/>
+                        </a:spcAft>
+                        <a:buClrTx/>
+                        <a:buSzTx/>
+                        <a:buFontTx/>
+                        <a:buNone/>
+                        <a:tabLst/>
+                        <a:defRPr/>
+                      </a:pPr>
+                      <a:r>
+                        <a:rPr lang="de-DE" sz="1600" kern="1200" dirty="0">
+                          <a:solidFill>
+                            <a:schemeClr val="dk1"/>
+                          </a:solidFill>
+                          <a:effectLst/>
+                          <a:latin typeface="+mn-lt"/>
+                          <a:ea typeface="+mn-ea"/>
+                          <a:cs typeface="+mn-cs"/>
+                        </a:rPr>
+                        <a:t>560,646ms (84,778%)</a:t>
+                      </a:r>
                     </a:p>
                   </a:txBody>
                   <a:tcPr>
@@ -13735,8 +13524,35 @@
                     <a:bodyPr/>
                     <a:lstStyle/>
                     <a:p>
-                      <a:pPr algn="ctr"/>
-                      <a:endParaRPr lang="de-DE" sz="1200" dirty="0"/>
+                      <a:pPr marL="0" marR="0" lvl="0" indent="0" algn="ctr" defTabSz="914400" rtl="0" eaLnBrk="1" fontAlgn="auto" latinLnBrk="0" hangingPunct="1">
+                        <a:lnSpc>
+                          <a:spcPct val="100000"/>
+                        </a:lnSpc>
+                        <a:spcBef>
+                          <a:spcPts val="0"/>
+                        </a:spcBef>
+                        <a:spcAft>
+                          <a:spcPts val="0"/>
+                        </a:spcAft>
+                        <a:buClrTx/>
+                        <a:buSzTx/>
+                        <a:buFontTx/>
+                        <a:buNone/>
+                        <a:tabLst/>
+                        <a:defRPr/>
+                      </a:pPr>
+                      <a:r>
+                        <a:rPr lang="de-DE" sz="1600" kern="1200" dirty="0">
+                          <a:solidFill>
+                            <a:schemeClr val="dk1"/>
+                          </a:solidFill>
+                          <a:effectLst/>
+                          <a:latin typeface="+mn-lt"/>
+                          <a:ea typeface="+mn-ea"/>
+                          <a:cs typeface="+mn-cs"/>
+                        </a:rPr>
+                        <a:t>9,588ms (50,162%)</a:t>
+                      </a:r>
                     </a:p>
                   </a:txBody>
                   <a:tcPr>
@@ -13774,8 +13590,35 @@
                     <a:bodyPr/>
                     <a:lstStyle/>
                     <a:p>
-                      <a:pPr algn="ctr"/>
-                      <a:endParaRPr lang="de-DE" sz="1200" dirty="0"/>
+                      <a:pPr marL="0" marR="0" lvl="0" indent="0" algn="ctr" defTabSz="914400" rtl="0" eaLnBrk="1" fontAlgn="auto" latinLnBrk="0" hangingPunct="1">
+                        <a:lnSpc>
+                          <a:spcPct val="100000"/>
+                        </a:lnSpc>
+                        <a:spcBef>
+                          <a:spcPts val="0"/>
+                        </a:spcBef>
+                        <a:spcAft>
+                          <a:spcPts val="0"/>
+                        </a:spcAft>
+                        <a:buClrTx/>
+                        <a:buSzTx/>
+                        <a:buFontTx/>
+                        <a:buNone/>
+                        <a:tabLst/>
+                        <a:defRPr/>
+                      </a:pPr>
+                      <a:r>
+                        <a:rPr lang="de-DE" sz="1600" kern="1200" dirty="0">
+                          <a:solidFill>
+                            <a:schemeClr val="dk1"/>
+                          </a:solidFill>
+                          <a:effectLst/>
+                          <a:latin typeface="+mn-lt"/>
+                          <a:ea typeface="+mn-ea"/>
+                          <a:cs typeface="+mn-cs"/>
+                        </a:rPr>
+                        <a:t>501,625ms (67,689%)</a:t>
+                      </a:r>
                     </a:p>
                   </a:txBody>
                   <a:tcPr>
@@ -13822,134 +13665,35 @@
                     <a:bodyPr/>
                     <a:lstStyle/>
                     <a:p>
-                      <a:pPr algn="ctr"/>
-                      <a:endParaRPr lang="de-DE" sz="1200" dirty="0"/>
-                    </a:p>
-                  </a:txBody>
-                  <a:tcPr>
-                    <a:lnL w="6350" cap="flat" cmpd="sng" algn="ctr">
-                      <a:solidFill>
-                        <a:schemeClr val="tx1"/>
-                      </a:solidFill>
-                      <a:prstDash val="sysDot"/>
-                      <a:round/>
-                      <a:headEnd type="none" w="med" len="med"/>
-                      <a:tailEnd type="none" w="med" len="med"/>
-                    </a:lnL>
-                    <a:lnT w="6350" cap="flat" cmpd="sng" algn="ctr">
-                      <a:solidFill>
-                        <a:schemeClr val="tx1"/>
-                      </a:solidFill>
-                      <a:prstDash val="sysDot"/>
-                      <a:round/>
-                      <a:headEnd type="none" w="med" len="med"/>
-                      <a:tailEnd type="none" w="med" len="med"/>
-                    </a:lnT>
-                    <a:lnB w="6350" cap="flat" cmpd="sng" algn="ctr">
-                      <a:solidFill>
-                        <a:schemeClr val="tx1"/>
-                      </a:solidFill>
-                      <a:prstDash val="sysDot"/>
-                      <a:round/>
-                      <a:headEnd type="none" w="med" len="med"/>
-                      <a:tailEnd type="none" w="med" len="med"/>
-                    </a:lnB>
-                  </a:tcPr>
-                </a:tc>
-                <a:tc>
-                  <a:txBody>
-                    <a:bodyPr/>
-                    <a:lstStyle/>
-                    <a:p>
-                      <a:pPr algn="ctr"/>
-                      <a:endParaRPr lang="de-DE" sz="1200" dirty="0"/>
-                    </a:p>
-                  </a:txBody>
-                  <a:tcPr>
-                    <a:lnR w="6350" cap="flat" cmpd="sng" algn="ctr">
-                      <a:solidFill>
-                        <a:schemeClr val="tx1"/>
-                      </a:solidFill>
-                      <a:prstDash val="sysDot"/>
-                      <a:round/>
-                      <a:headEnd type="none" w="med" len="med"/>
-                      <a:tailEnd type="none" w="med" len="med"/>
-                    </a:lnR>
-                    <a:lnT w="6350" cap="flat" cmpd="sng" algn="ctr">
-                      <a:solidFill>
-                        <a:schemeClr val="tx1"/>
-                      </a:solidFill>
-                      <a:prstDash val="sysDot"/>
-                      <a:round/>
-                      <a:headEnd type="none" w="med" len="med"/>
-                      <a:tailEnd type="none" w="med" len="med"/>
-                    </a:lnT>
-                    <a:lnB w="6350" cap="flat" cmpd="sng" algn="ctr">
-                      <a:solidFill>
-                        <a:schemeClr val="tx1"/>
-                      </a:solidFill>
-                      <a:prstDash val="sysDot"/>
-                      <a:round/>
-                      <a:headEnd type="none" w="med" len="med"/>
-                      <a:tailEnd type="none" w="med" len="med"/>
-                    </a:lnB>
-                  </a:tcPr>
-                </a:tc>
-                <a:tc>
-                  <a:txBody>
-                    <a:bodyPr/>
-                    <a:lstStyle/>
-                    <a:p>
-                      <a:pPr algn="ctr"/>
-                      <a:endParaRPr lang="de-DE" sz="1200" dirty="0"/>
-                    </a:p>
-                  </a:txBody>
-                  <a:tcPr>
-                    <a:lnL w="6350" cap="flat" cmpd="sng" algn="ctr">
-                      <a:solidFill>
-                        <a:schemeClr val="tx1"/>
-                      </a:solidFill>
-                      <a:prstDash val="sysDot"/>
-                      <a:round/>
-                      <a:headEnd type="none" w="med" len="med"/>
-                      <a:tailEnd type="none" w="med" len="med"/>
-                    </a:lnL>
-                    <a:lnR w="6350" cap="flat" cmpd="sng" algn="ctr">
-                      <a:solidFill>
-                        <a:schemeClr val="tx1"/>
-                      </a:solidFill>
-                      <a:prstDash val="sysDot"/>
-                      <a:round/>
-                      <a:headEnd type="none" w="med" len="med"/>
-                      <a:tailEnd type="none" w="med" len="med"/>
-                    </a:lnR>
-                    <a:lnT w="6350" cap="flat" cmpd="sng" algn="ctr">
-                      <a:solidFill>
-                        <a:schemeClr val="tx1"/>
-                      </a:solidFill>
-                      <a:prstDash val="sysDot"/>
-                      <a:round/>
-                      <a:headEnd type="none" w="med" len="med"/>
-                      <a:tailEnd type="none" w="med" len="med"/>
-                    </a:lnT>
-                    <a:lnB w="6350" cap="flat" cmpd="sng" algn="ctr">
-                      <a:solidFill>
-                        <a:schemeClr val="tx1"/>
-                      </a:solidFill>
-                      <a:prstDash val="sysDot"/>
-                      <a:round/>
-                      <a:headEnd type="none" w="med" len="med"/>
-                      <a:tailEnd type="none" w="med" len="med"/>
-                    </a:lnB>
-                  </a:tcPr>
-                </a:tc>
-                <a:tc>
-                  <a:txBody>
-                    <a:bodyPr/>
-                    <a:lstStyle/>
-                    <a:p>
-                      <a:pPr algn="ctr"/>
-                      <a:endParaRPr lang="de-DE" sz="1200" dirty="0"/>
+                      <a:pPr marL="0" marR="0" lvl="0" indent="0" algn="ctr" defTabSz="914400" rtl="0" eaLnBrk="1" fontAlgn="auto" latinLnBrk="0" hangingPunct="1">
+                        <a:lnSpc>
+                          <a:spcPct val="100000"/>
+                        </a:lnSpc>
+                        <a:spcBef>
+                          <a:spcPts val="0"/>
+                        </a:spcBef>
+                        <a:spcAft>
+                          <a:spcPts val="0"/>
+                        </a:spcAft>
+                        <a:buClrTx/>
+                        <a:buSzTx/>
+                        <a:buFontTx/>
+                        <a:buNone/>
+                        <a:tabLst/>
+                        <a:defRPr/>
+                      </a:pPr>
+                      <a:r>
+                        <a:rPr lang="de-DE" sz="1600" kern="1200" dirty="0">
+                          <a:solidFill>
+                            <a:schemeClr val="dk1"/>
+                          </a:solidFill>
+                          <a:effectLst/>
+                          <a:latin typeface="+mn-lt"/>
+                          <a:ea typeface="+mn-ea"/>
+                          <a:cs typeface="+mn-cs"/>
+                        </a:rPr>
+                        <a:t>24843,991ms (85,244%)</a:t>
+                      </a:r>
                     </a:p>
                   </a:txBody>
                   <a:tcPr>
@@ -14028,8 +13772,35 @@
                     <a:bodyPr/>
                     <a:lstStyle/>
                     <a:p>
-                      <a:pPr algn="ctr"/>
-                      <a:endParaRPr lang="de-DE" sz="1200" dirty="0"/>
+                      <a:pPr marL="0" marR="0" lvl="0" indent="0" algn="ctr" defTabSz="914400" rtl="0" eaLnBrk="1" fontAlgn="auto" latinLnBrk="0" hangingPunct="1">
+                        <a:lnSpc>
+                          <a:spcPct val="100000"/>
+                        </a:lnSpc>
+                        <a:spcBef>
+                          <a:spcPts val="0"/>
+                        </a:spcBef>
+                        <a:spcAft>
+                          <a:spcPts val="0"/>
+                        </a:spcAft>
+                        <a:buClrTx/>
+                        <a:buSzTx/>
+                        <a:buFontTx/>
+                        <a:buNone/>
+                        <a:tabLst/>
+                        <a:defRPr/>
+                      </a:pPr>
+                      <a:r>
+                        <a:rPr lang="de-DE" sz="1600" kern="1200" dirty="0">
+                          <a:solidFill>
+                            <a:schemeClr val="dk1"/>
+                          </a:solidFill>
+                          <a:effectLst/>
+                          <a:latin typeface="+mn-lt"/>
+                          <a:ea typeface="+mn-ea"/>
+                          <a:cs typeface="+mn-cs"/>
+                        </a:rPr>
+                        <a:t>8,606ms (79,099%)</a:t>
+                      </a:r>
                     </a:p>
                   </a:txBody>
                   <a:tcPr>
@@ -14058,8 +13829,35 @@
                     <a:bodyPr/>
                     <a:lstStyle/>
                     <a:p>
-                      <a:pPr algn="ctr"/>
-                      <a:endParaRPr lang="de-DE" sz="1200" dirty="0"/>
+                      <a:pPr marL="0" marR="0" lvl="0" indent="0" algn="ctr" defTabSz="914400" rtl="0" eaLnBrk="1" fontAlgn="auto" latinLnBrk="0" hangingPunct="1">
+                        <a:lnSpc>
+                          <a:spcPct val="100000"/>
+                        </a:lnSpc>
+                        <a:spcBef>
+                          <a:spcPts val="0"/>
+                        </a:spcBef>
+                        <a:spcAft>
+                          <a:spcPts val="0"/>
+                        </a:spcAft>
+                        <a:buClrTx/>
+                        <a:buSzTx/>
+                        <a:buFontTx/>
+                        <a:buNone/>
+                        <a:tabLst/>
+                        <a:defRPr/>
+                      </a:pPr>
+                      <a:r>
+                        <a:rPr lang="de-DE" sz="1600" kern="1200" dirty="0">
+                          <a:solidFill>
+                            <a:schemeClr val="dk1"/>
+                          </a:solidFill>
+                          <a:effectLst/>
+                          <a:latin typeface="+mn-lt"/>
+                          <a:ea typeface="+mn-ea"/>
+                          <a:cs typeface="+mn-cs"/>
+                        </a:rPr>
+                        <a:t>306,032ms (88,523%)</a:t>
+                      </a:r>
                     </a:p>
                   </a:txBody>
                   <a:tcPr>
@@ -14097,107 +13895,35 @@
                     <a:bodyPr/>
                     <a:lstStyle/>
                     <a:p>
-                      <a:pPr algn="ctr"/>
-                      <a:endParaRPr lang="de-DE" sz="1200" dirty="0"/>
-                    </a:p>
-                  </a:txBody>
-                  <a:tcPr>
-                    <a:lnL w="6350" cap="flat" cmpd="sng" algn="ctr">
-                      <a:solidFill>
-                        <a:schemeClr val="tx1"/>
-                      </a:solidFill>
-                      <a:prstDash val="sysDot"/>
-                      <a:round/>
-                      <a:headEnd type="none" w="med" len="med"/>
-                      <a:tailEnd type="none" w="med" len="med"/>
-                    </a:lnL>
-                    <a:lnT w="6350" cap="flat" cmpd="sng" algn="ctr">
-                      <a:solidFill>
-                        <a:schemeClr val="tx1"/>
-                      </a:solidFill>
-                      <a:prstDash val="sysDot"/>
-                      <a:round/>
-                      <a:headEnd type="none" w="med" len="med"/>
-                      <a:tailEnd type="none" w="med" len="med"/>
-                    </a:lnT>
-                  </a:tcPr>
-                </a:tc>
-                <a:tc>
-                  <a:txBody>
-                    <a:bodyPr/>
-                    <a:lstStyle/>
-                    <a:p>
-                      <a:pPr algn="ctr"/>
-                      <a:endParaRPr lang="de-DE" sz="1200" dirty="0"/>
-                    </a:p>
-                  </a:txBody>
-                  <a:tcPr>
-                    <a:lnR w="6350" cap="flat" cmpd="sng" algn="ctr">
-                      <a:solidFill>
-                        <a:schemeClr val="tx1"/>
-                      </a:solidFill>
-                      <a:prstDash val="sysDot"/>
-                      <a:round/>
-                      <a:headEnd type="none" w="med" len="med"/>
-                      <a:tailEnd type="none" w="med" len="med"/>
-                    </a:lnR>
-                    <a:lnT w="6350" cap="flat" cmpd="sng" algn="ctr">
-                      <a:solidFill>
-                        <a:schemeClr val="tx1"/>
-                      </a:solidFill>
-                      <a:prstDash val="sysDot"/>
-                      <a:round/>
-                      <a:headEnd type="none" w="med" len="med"/>
-                      <a:tailEnd type="none" w="med" len="med"/>
-                    </a:lnT>
-                  </a:tcPr>
-                </a:tc>
-                <a:tc>
-                  <a:txBody>
-                    <a:bodyPr/>
-                    <a:lstStyle/>
-                    <a:p>
-                      <a:pPr algn="ctr"/>
-                      <a:endParaRPr lang="de-DE" sz="1200" dirty="0"/>
-                    </a:p>
-                  </a:txBody>
-                  <a:tcPr>
-                    <a:lnL w="6350" cap="flat" cmpd="sng" algn="ctr">
-                      <a:solidFill>
-                        <a:schemeClr val="tx1"/>
-                      </a:solidFill>
-                      <a:prstDash val="sysDot"/>
-                      <a:round/>
-                      <a:headEnd type="none" w="med" len="med"/>
-                      <a:tailEnd type="none" w="med" len="med"/>
-                    </a:lnL>
-                    <a:lnR w="6350" cap="flat" cmpd="sng" algn="ctr">
-                      <a:solidFill>
-                        <a:schemeClr val="tx1"/>
-                      </a:solidFill>
-                      <a:prstDash val="sysDot"/>
-                      <a:round/>
-                      <a:headEnd type="none" w="med" len="med"/>
-                      <a:tailEnd type="none" w="med" len="med"/>
-                    </a:lnR>
-                    <a:lnT w="6350" cap="flat" cmpd="sng" algn="ctr">
-                      <a:solidFill>
-                        <a:schemeClr val="tx1"/>
-                      </a:solidFill>
-                      <a:prstDash val="sysDot"/>
-                      <a:round/>
-                      <a:headEnd type="none" w="med" len="med"/>
-                      <a:tailEnd type="none" w="med" len="med"/>
-                    </a:lnT>
-                  </a:tcPr>
-                </a:tc>
-                <a:tc>
-                  <a:txBody>
-                    <a:bodyPr/>
-                    <a:lstStyle/>
-                    <a:p>
-                      <a:pPr algn="ctr"/>
-                      <a:endParaRPr lang="de-DE" sz="1200" dirty="0"/>
+                      <a:pPr marL="0" marR="0" lvl="0" indent="0" algn="ctr" defTabSz="914400" rtl="0" eaLnBrk="1" fontAlgn="auto" latinLnBrk="0" hangingPunct="1">
+                        <a:lnSpc>
+                          <a:spcPct val="100000"/>
+                        </a:lnSpc>
+                        <a:spcBef>
+                          <a:spcPts val="0"/>
+                        </a:spcBef>
+                        <a:spcAft>
+                          <a:spcPts val="0"/>
+                        </a:spcAft>
+                        <a:buClrTx/>
+                        <a:buSzTx/>
+                        <a:buFontTx/>
+                        <a:buNone/>
+                        <a:tabLst/>
+                        <a:defRPr/>
+                      </a:pPr>
+                      <a:r>
+                        <a:rPr lang="de-DE" sz="1600" kern="1200" dirty="0">
+                          <a:solidFill>
+                            <a:schemeClr val="dk1"/>
+                          </a:solidFill>
+                          <a:effectLst/>
+                          <a:latin typeface="+mn-lt"/>
+                          <a:ea typeface="+mn-ea"/>
+                          <a:cs typeface="+mn-cs"/>
+                        </a:rPr>
+                        <a:t>11119,287ms (96,457%)</a:t>
+                      </a:r>
                     </a:p>
                   </a:txBody>
                   <a:tcPr>
@@ -14289,8 +14015,35 @@
                     <a:bodyPr/>
                     <a:lstStyle/>
                     <a:p>
-                      <a:pPr algn="ctr"/>
-                      <a:endParaRPr lang="de-DE" sz="1200" dirty="0"/>
+                      <a:pPr marL="0" marR="0" lvl="0" indent="0" algn="ctr" defTabSz="914400" rtl="0" eaLnBrk="1" fontAlgn="auto" latinLnBrk="0" hangingPunct="1">
+                        <a:lnSpc>
+                          <a:spcPct val="100000"/>
+                        </a:lnSpc>
+                        <a:spcBef>
+                          <a:spcPts val="0"/>
+                        </a:spcBef>
+                        <a:spcAft>
+                          <a:spcPts val="0"/>
+                        </a:spcAft>
+                        <a:buClrTx/>
+                        <a:buSzTx/>
+                        <a:buFontTx/>
+                        <a:buNone/>
+                        <a:tabLst/>
+                        <a:defRPr/>
+                      </a:pPr>
+                      <a:r>
+                        <a:rPr lang="de-DE" sz="1600" kern="1200" dirty="0">
+                          <a:solidFill>
+                            <a:schemeClr val="dk1"/>
+                          </a:solidFill>
+                          <a:effectLst/>
+                          <a:latin typeface="+mn-lt"/>
+                          <a:ea typeface="+mn-ea"/>
+                          <a:cs typeface="+mn-cs"/>
+                        </a:rPr>
+                        <a:t>-0,275ms (-7,059%)</a:t>
+                      </a:r>
                     </a:p>
                   </a:txBody>
                   <a:tcPr>
@@ -14319,8 +14072,35 @@
                     <a:bodyPr/>
                     <a:lstStyle/>
                     <a:p>
-                      <a:pPr algn="ctr"/>
-                      <a:endParaRPr lang="de-DE" sz="1200" dirty="0"/>
+                      <a:pPr marL="0" marR="0" lvl="0" indent="0" algn="ctr" defTabSz="914400" rtl="0" eaLnBrk="1" fontAlgn="auto" latinLnBrk="0" hangingPunct="1">
+                        <a:lnSpc>
+                          <a:spcPct val="100000"/>
+                        </a:lnSpc>
+                        <a:spcBef>
+                          <a:spcPts val="0"/>
+                        </a:spcBef>
+                        <a:spcAft>
+                          <a:spcPts val="0"/>
+                        </a:spcAft>
+                        <a:buClrTx/>
+                        <a:buSzTx/>
+                        <a:buFontTx/>
+                        <a:buNone/>
+                        <a:tabLst/>
+                        <a:defRPr/>
+                      </a:pPr>
+                      <a:r>
+                        <a:rPr lang="de-DE" sz="1600" kern="1200" dirty="0">
+                          <a:solidFill>
+                            <a:schemeClr val="dk1"/>
+                          </a:solidFill>
+                          <a:effectLst/>
+                          <a:latin typeface="+mn-lt"/>
+                          <a:ea typeface="+mn-ea"/>
+                          <a:cs typeface="+mn-cs"/>
+                        </a:rPr>
+                        <a:t>42,673ms (68,776%)</a:t>
+                      </a:r>
                     </a:p>
                   </a:txBody>
                   <a:tcPr>
@@ -14358,107 +14138,35 @@
                     <a:bodyPr/>
                     <a:lstStyle/>
                     <a:p>
-                      <a:pPr algn="ctr"/>
-                      <a:endParaRPr lang="de-DE" sz="1200" dirty="0"/>
-                    </a:p>
-                  </a:txBody>
-                  <a:tcPr>
-                    <a:lnL w="6350" cap="flat" cmpd="sng" algn="ctr">
-                      <a:solidFill>
-                        <a:schemeClr val="tx1"/>
-                      </a:solidFill>
-                      <a:prstDash val="sysDot"/>
-                      <a:round/>
-                      <a:headEnd type="none" w="med" len="med"/>
-                      <a:tailEnd type="none" w="med" len="med"/>
-                    </a:lnL>
-                    <a:lnB w="6350" cap="flat" cmpd="sng" algn="ctr">
-                      <a:solidFill>
-                        <a:schemeClr val="tx1"/>
-                      </a:solidFill>
-                      <a:prstDash val="sysDot"/>
-                      <a:round/>
-                      <a:headEnd type="none" w="med" len="med"/>
-                      <a:tailEnd type="none" w="med" len="med"/>
-                    </a:lnB>
-                  </a:tcPr>
-                </a:tc>
-                <a:tc>
-                  <a:txBody>
-                    <a:bodyPr/>
-                    <a:lstStyle/>
-                    <a:p>
-                      <a:pPr algn="ctr"/>
-                      <a:endParaRPr lang="de-DE" sz="1200" dirty="0"/>
-                    </a:p>
-                  </a:txBody>
-                  <a:tcPr>
-                    <a:lnR w="6350" cap="flat" cmpd="sng" algn="ctr">
-                      <a:solidFill>
-                        <a:schemeClr val="tx1"/>
-                      </a:solidFill>
-                      <a:prstDash val="sysDot"/>
-                      <a:round/>
-                      <a:headEnd type="none" w="med" len="med"/>
-                      <a:tailEnd type="none" w="med" len="med"/>
-                    </a:lnR>
-                    <a:lnB w="6350" cap="flat" cmpd="sng" algn="ctr">
-                      <a:solidFill>
-                        <a:schemeClr val="tx1"/>
-                      </a:solidFill>
-                      <a:prstDash val="sysDot"/>
-                      <a:round/>
-                      <a:headEnd type="none" w="med" len="med"/>
-                      <a:tailEnd type="none" w="med" len="med"/>
-                    </a:lnB>
-                  </a:tcPr>
-                </a:tc>
-                <a:tc>
-                  <a:txBody>
-                    <a:bodyPr/>
-                    <a:lstStyle/>
-                    <a:p>
-                      <a:pPr algn="ctr"/>
-                      <a:endParaRPr lang="de-DE" sz="1200" dirty="0"/>
-                    </a:p>
-                  </a:txBody>
-                  <a:tcPr>
-                    <a:lnL w="6350" cap="flat" cmpd="sng" algn="ctr">
-                      <a:solidFill>
-                        <a:schemeClr val="tx1"/>
-                      </a:solidFill>
-                      <a:prstDash val="sysDot"/>
-                      <a:round/>
-                      <a:headEnd type="none" w="med" len="med"/>
-                      <a:tailEnd type="none" w="med" len="med"/>
-                    </a:lnL>
-                    <a:lnR w="6350" cap="flat" cmpd="sng" algn="ctr">
-                      <a:solidFill>
-                        <a:schemeClr val="tx1"/>
-                      </a:solidFill>
-                      <a:prstDash val="sysDot"/>
-                      <a:round/>
-                      <a:headEnd type="none" w="med" len="med"/>
-                      <a:tailEnd type="none" w="med" len="med"/>
-                    </a:lnR>
-                    <a:lnB w="6350" cap="flat" cmpd="sng" algn="ctr">
-                      <a:solidFill>
-                        <a:schemeClr val="tx1"/>
-                      </a:solidFill>
-                      <a:prstDash val="sysDot"/>
-                      <a:round/>
-                      <a:headEnd type="none" w="med" len="med"/>
-                      <a:tailEnd type="none" w="med" len="med"/>
-                    </a:lnB>
-                  </a:tcPr>
-                </a:tc>
-                <a:tc>
-                  <a:txBody>
-                    <a:bodyPr/>
-                    <a:lstStyle/>
-                    <a:p>
-                      <a:pPr algn="ctr"/>
-                      <a:endParaRPr lang="de-DE" sz="1200" dirty="0"/>
+                      <a:pPr marL="0" marR="0" lvl="0" indent="0" algn="ctr" defTabSz="914400" rtl="0" eaLnBrk="1" fontAlgn="auto" latinLnBrk="0" hangingPunct="1">
+                        <a:lnSpc>
+                          <a:spcPct val="100000"/>
+                        </a:lnSpc>
+                        <a:spcBef>
+                          <a:spcPts val="0"/>
+                        </a:spcBef>
+                        <a:spcAft>
+                          <a:spcPts val="0"/>
+                        </a:spcAft>
+                        <a:buClrTx/>
+                        <a:buSzTx/>
+                        <a:buFontTx/>
+                        <a:buNone/>
+                        <a:tabLst/>
+                        <a:defRPr/>
+                      </a:pPr>
+                      <a:r>
+                        <a:rPr lang="de-DE" sz="1600" kern="1200" dirty="0">
+                          <a:solidFill>
+                            <a:schemeClr val="dk1"/>
+                          </a:solidFill>
+                          <a:effectLst/>
+                          <a:latin typeface="+mn-lt"/>
+                          <a:ea typeface="+mn-ea"/>
+                          <a:cs typeface="+mn-cs"/>
+                        </a:rPr>
+                        <a:t>976,321ms (86,140%)</a:t>
+                      </a:r>
                     </a:p>
                   </a:txBody>
                   <a:tcPr>
@@ -14537,8 +14245,35 @@
                     <a:bodyPr/>
                     <a:lstStyle/>
                     <a:p>
-                      <a:pPr algn="ctr"/>
-                      <a:endParaRPr lang="de-DE" sz="1200" dirty="0"/>
+                      <a:pPr marL="0" marR="0" lvl="0" indent="0" algn="ctr" defTabSz="914400" rtl="0" eaLnBrk="1" fontAlgn="auto" latinLnBrk="0" hangingPunct="1">
+                        <a:lnSpc>
+                          <a:spcPct val="100000"/>
+                        </a:lnSpc>
+                        <a:spcBef>
+                          <a:spcPts val="0"/>
+                        </a:spcBef>
+                        <a:spcAft>
+                          <a:spcPts val="0"/>
+                        </a:spcAft>
+                        <a:buClrTx/>
+                        <a:buSzTx/>
+                        <a:buFontTx/>
+                        <a:buNone/>
+                        <a:tabLst/>
+                        <a:defRPr/>
+                      </a:pPr>
+                      <a:r>
+                        <a:rPr lang="de-DE" sz="1600" kern="1200" dirty="0">
+                          <a:solidFill>
+                            <a:schemeClr val="dk1"/>
+                          </a:solidFill>
+                          <a:effectLst/>
+                          <a:latin typeface="+mn-lt"/>
+                          <a:ea typeface="+mn-ea"/>
+                          <a:cs typeface="+mn-cs"/>
+                        </a:rPr>
+                        <a:t>21,011ms (58,239%)</a:t>
+                      </a:r>
                     </a:p>
                   </a:txBody>
                   <a:tcPr>
@@ -14576,8 +14311,35 @@
                     <a:bodyPr/>
                     <a:lstStyle/>
                     <a:p>
-                      <a:pPr algn="ctr"/>
-                      <a:endParaRPr lang="de-DE" sz="1200" dirty="0"/>
+                      <a:pPr marL="0" marR="0" lvl="0" indent="0" algn="ctr" defTabSz="914400" rtl="0" eaLnBrk="1" fontAlgn="auto" latinLnBrk="0" hangingPunct="1">
+                        <a:lnSpc>
+                          <a:spcPct val="100000"/>
+                        </a:lnSpc>
+                        <a:spcBef>
+                          <a:spcPts val="0"/>
+                        </a:spcBef>
+                        <a:spcAft>
+                          <a:spcPts val="0"/>
+                        </a:spcAft>
+                        <a:buClrTx/>
+                        <a:buSzTx/>
+                        <a:buFontTx/>
+                        <a:buNone/>
+                        <a:tabLst/>
+                        <a:defRPr/>
+                      </a:pPr>
+                      <a:r>
+                        <a:rPr lang="de-DE" sz="1600" kern="1200" dirty="0">
+                          <a:solidFill>
+                            <a:schemeClr val="dk1"/>
+                          </a:solidFill>
+                          <a:effectLst/>
+                          <a:latin typeface="+mn-lt"/>
+                          <a:ea typeface="+mn-ea"/>
+                          <a:cs typeface="+mn-cs"/>
+                        </a:rPr>
+                        <a:t>922,849ms (70,758%)</a:t>
+                      </a:r>
                     </a:p>
                   </a:txBody>
                   <a:tcPr>
@@ -14624,134 +14386,35 @@
                     <a:bodyPr/>
                     <a:lstStyle/>
                     <a:p>
-                      <a:pPr algn="ctr"/>
-                      <a:endParaRPr lang="de-DE" sz="1200" dirty="0"/>
-                    </a:p>
-                  </a:txBody>
-                  <a:tcPr>
-                    <a:lnL w="6350" cap="flat" cmpd="sng" algn="ctr">
-                      <a:solidFill>
-                        <a:schemeClr val="tx1"/>
-                      </a:solidFill>
-                      <a:prstDash val="sysDot"/>
-                      <a:round/>
-                      <a:headEnd type="none" w="med" len="med"/>
-                      <a:tailEnd type="none" w="med" len="med"/>
-                    </a:lnL>
-                    <a:lnT w="6350" cap="flat" cmpd="sng" algn="ctr">
-                      <a:solidFill>
-                        <a:schemeClr val="tx1"/>
-                      </a:solidFill>
-                      <a:prstDash val="sysDot"/>
-                      <a:round/>
-                      <a:headEnd type="none" w="med" len="med"/>
-                      <a:tailEnd type="none" w="med" len="med"/>
-                    </a:lnT>
-                    <a:lnB w="6350" cap="flat" cmpd="sng" algn="ctr">
-                      <a:solidFill>
-                        <a:schemeClr val="tx1"/>
-                      </a:solidFill>
-                      <a:prstDash val="sysDot"/>
-                      <a:round/>
-                      <a:headEnd type="none" w="med" len="med"/>
-                      <a:tailEnd type="none" w="med" len="med"/>
-                    </a:lnB>
-                  </a:tcPr>
-                </a:tc>
-                <a:tc>
-                  <a:txBody>
-                    <a:bodyPr/>
-                    <a:lstStyle/>
-                    <a:p>
-                      <a:pPr algn="ctr"/>
-                      <a:endParaRPr lang="de-DE" sz="1200" dirty="0"/>
-                    </a:p>
-                  </a:txBody>
-                  <a:tcPr>
-                    <a:lnR w="6350" cap="flat" cmpd="sng" algn="ctr">
-                      <a:solidFill>
-                        <a:schemeClr val="tx1"/>
-                      </a:solidFill>
-                      <a:prstDash val="sysDot"/>
-                      <a:round/>
-                      <a:headEnd type="none" w="med" len="med"/>
-                      <a:tailEnd type="none" w="med" len="med"/>
-                    </a:lnR>
-                    <a:lnT w="6350" cap="flat" cmpd="sng" algn="ctr">
-                      <a:solidFill>
-                        <a:schemeClr val="tx1"/>
-                      </a:solidFill>
-                      <a:prstDash val="sysDot"/>
-                      <a:round/>
-                      <a:headEnd type="none" w="med" len="med"/>
-                      <a:tailEnd type="none" w="med" len="med"/>
-                    </a:lnT>
-                    <a:lnB w="6350" cap="flat" cmpd="sng" algn="ctr">
-                      <a:solidFill>
-                        <a:schemeClr val="tx1"/>
-                      </a:solidFill>
-                      <a:prstDash val="sysDot"/>
-                      <a:round/>
-                      <a:headEnd type="none" w="med" len="med"/>
-                      <a:tailEnd type="none" w="med" len="med"/>
-                    </a:lnB>
-                  </a:tcPr>
-                </a:tc>
-                <a:tc>
-                  <a:txBody>
-                    <a:bodyPr/>
-                    <a:lstStyle/>
-                    <a:p>
-                      <a:pPr algn="ctr"/>
-                      <a:endParaRPr lang="de-DE" sz="1200" dirty="0"/>
-                    </a:p>
-                  </a:txBody>
-                  <a:tcPr>
-                    <a:lnL w="6350" cap="flat" cmpd="sng" algn="ctr">
-                      <a:solidFill>
-                        <a:schemeClr val="tx1"/>
-                      </a:solidFill>
-                      <a:prstDash val="sysDot"/>
-                      <a:round/>
-                      <a:headEnd type="none" w="med" len="med"/>
-                      <a:tailEnd type="none" w="med" len="med"/>
-                    </a:lnL>
-                    <a:lnR w="6350" cap="flat" cmpd="sng" algn="ctr">
-                      <a:solidFill>
-                        <a:schemeClr val="tx1"/>
-                      </a:solidFill>
-                      <a:prstDash val="sysDot"/>
-                      <a:round/>
-                      <a:headEnd type="none" w="med" len="med"/>
-                      <a:tailEnd type="none" w="med" len="med"/>
-                    </a:lnR>
-                    <a:lnT w="6350" cap="flat" cmpd="sng" algn="ctr">
-                      <a:solidFill>
-                        <a:schemeClr val="tx1"/>
-                      </a:solidFill>
-                      <a:prstDash val="sysDot"/>
-                      <a:round/>
-                      <a:headEnd type="none" w="med" len="med"/>
-                      <a:tailEnd type="none" w="med" len="med"/>
-                    </a:lnT>
-                    <a:lnB w="6350" cap="flat" cmpd="sng" algn="ctr">
-                      <a:solidFill>
-                        <a:schemeClr val="tx1"/>
-                      </a:solidFill>
-                      <a:prstDash val="sysDot"/>
-                      <a:round/>
-                      <a:headEnd type="none" w="med" len="med"/>
-                      <a:tailEnd type="none" w="med" len="med"/>
-                    </a:lnB>
-                  </a:tcPr>
-                </a:tc>
-                <a:tc>
-                  <a:txBody>
-                    <a:bodyPr/>
-                    <a:lstStyle/>
-                    <a:p>
-                      <a:pPr algn="ctr"/>
-                      <a:endParaRPr lang="de-DE" sz="1200" dirty="0"/>
+                      <a:pPr marL="0" marR="0" lvl="0" indent="0" algn="ctr" defTabSz="914400" rtl="0" eaLnBrk="1" fontAlgn="auto" latinLnBrk="0" hangingPunct="1">
+                        <a:lnSpc>
+                          <a:spcPct val="100000"/>
+                        </a:lnSpc>
+                        <a:spcBef>
+                          <a:spcPts val="0"/>
+                        </a:spcBef>
+                        <a:spcAft>
+                          <a:spcPts val="0"/>
+                        </a:spcAft>
+                        <a:buClrTx/>
+                        <a:buSzTx/>
+                        <a:buFontTx/>
+                        <a:buNone/>
+                        <a:tabLst/>
+                        <a:defRPr/>
+                      </a:pPr>
+                      <a:r>
+                        <a:rPr lang="de-DE" sz="1600" kern="1200" dirty="0">
+                          <a:solidFill>
+                            <a:schemeClr val="dk1"/>
+                          </a:solidFill>
+                          <a:effectLst/>
+                          <a:latin typeface="+mn-lt"/>
+                          <a:ea typeface="+mn-ea"/>
+                          <a:cs typeface="+mn-cs"/>
+                        </a:rPr>
+                        <a:t>43926,629ms (85,399%)</a:t>
+                      </a:r>
                     </a:p>
                   </a:txBody>
                   <a:tcPr>
@@ -14830,8 +14493,35 @@
                     <a:bodyPr/>
                     <a:lstStyle/>
                     <a:p>
-                      <a:pPr algn="ctr"/>
-                      <a:endParaRPr lang="de-DE" sz="1200" dirty="0"/>
+                      <a:pPr marL="0" marR="0" lvl="0" indent="0" algn="ctr" defTabSz="914400" rtl="0" eaLnBrk="1" fontAlgn="auto" latinLnBrk="0" hangingPunct="1">
+                        <a:lnSpc>
+                          <a:spcPct val="100000"/>
+                        </a:lnSpc>
+                        <a:spcBef>
+                          <a:spcPts val="0"/>
+                        </a:spcBef>
+                        <a:spcAft>
+                          <a:spcPts val="0"/>
+                        </a:spcAft>
+                        <a:buClrTx/>
+                        <a:buSzTx/>
+                        <a:buFontTx/>
+                        <a:buNone/>
+                        <a:tabLst/>
+                        <a:defRPr/>
+                      </a:pPr>
+                      <a:r>
+                        <a:rPr lang="de-DE" sz="1600" kern="1200" dirty="0">
+                          <a:solidFill>
+                            <a:schemeClr val="dk1"/>
+                          </a:solidFill>
+                          <a:effectLst/>
+                          <a:latin typeface="+mn-lt"/>
+                          <a:ea typeface="+mn-ea"/>
+                          <a:cs typeface="+mn-cs"/>
+                        </a:rPr>
+                        <a:t>21,290ms (86,517%)</a:t>
+                      </a:r>
                     </a:p>
                   </a:txBody>
                   <a:tcPr>
@@ -14860,8 +14550,35 @@
                     <a:bodyPr/>
                     <a:lstStyle/>
                     <a:p>
-                      <a:pPr algn="ctr"/>
-                      <a:endParaRPr lang="de-DE" sz="1200" dirty="0"/>
+                      <a:pPr marL="0" marR="0" lvl="0" indent="0" algn="ctr" defTabSz="914400" rtl="0" eaLnBrk="1" fontAlgn="auto" latinLnBrk="0" hangingPunct="1">
+                        <a:lnSpc>
+                          <a:spcPct val="100000"/>
+                        </a:lnSpc>
+                        <a:spcBef>
+                          <a:spcPts val="0"/>
+                        </a:spcBef>
+                        <a:spcAft>
+                          <a:spcPts val="0"/>
+                        </a:spcAft>
+                        <a:buClrTx/>
+                        <a:buSzTx/>
+                        <a:buFontTx/>
+                        <a:buNone/>
+                        <a:tabLst/>
+                        <a:defRPr/>
+                      </a:pPr>
+                      <a:r>
+                        <a:rPr lang="de-DE" sz="1600" kern="1200" dirty="0">
+                          <a:solidFill>
+                            <a:schemeClr val="dk1"/>
+                          </a:solidFill>
+                          <a:effectLst/>
+                          <a:latin typeface="+mn-lt"/>
+                          <a:ea typeface="+mn-ea"/>
+                          <a:cs typeface="+mn-cs"/>
+                        </a:rPr>
+                        <a:t>526,234ms (89,622%)</a:t>
+                      </a:r>
                     </a:p>
                   </a:txBody>
                   <a:tcPr>
@@ -14899,107 +14616,35 @@
                     <a:bodyPr/>
                     <a:lstStyle/>
                     <a:p>
-                      <a:pPr algn="ctr"/>
-                      <a:endParaRPr lang="de-DE" sz="1200" dirty="0"/>
-                    </a:p>
-                  </a:txBody>
-                  <a:tcPr>
-                    <a:lnL w="6350" cap="flat" cmpd="sng" algn="ctr">
-                      <a:solidFill>
-                        <a:schemeClr val="tx1"/>
-                      </a:solidFill>
-                      <a:prstDash val="sysDot"/>
-                      <a:round/>
-                      <a:headEnd type="none" w="med" len="med"/>
-                      <a:tailEnd type="none" w="med" len="med"/>
-                    </a:lnL>
-                    <a:lnT w="6350" cap="flat" cmpd="sng" algn="ctr">
-                      <a:solidFill>
-                        <a:schemeClr val="tx1"/>
-                      </a:solidFill>
-                      <a:prstDash val="sysDot"/>
-                      <a:round/>
-                      <a:headEnd type="none" w="med" len="med"/>
-                      <a:tailEnd type="none" w="med" len="med"/>
-                    </a:lnT>
-                  </a:tcPr>
-                </a:tc>
-                <a:tc>
-                  <a:txBody>
-                    <a:bodyPr/>
-                    <a:lstStyle/>
-                    <a:p>
-                      <a:pPr algn="ctr"/>
-                      <a:endParaRPr lang="de-DE" sz="1200" dirty="0"/>
-                    </a:p>
-                  </a:txBody>
-                  <a:tcPr>
-                    <a:lnR w="6350" cap="flat" cmpd="sng" algn="ctr">
-                      <a:solidFill>
-                        <a:schemeClr val="tx1"/>
-                      </a:solidFill>
-                      <a:prstDash val="sysDot"/>
-                      <a:round/>
-                      <a:headEnd type="none" w="med" len="med"/>
-                      <a:tailEnd type="none" w="med" len="med"/>
-                    </a:lnR>
-                    <a:lnT w="6350" cap="flat" cmpd="sng" algn="ctr">
-                      <a:solidFill>
-                        <a:schemeClr val="tx1"/>
-                      </a:solidFill>
-                      <a:prstDash val="sysDot"/>
-                      <a:round/>
-                      <a:headEnd type="none" w="med" len="med"/>
-                      <a:tailEnd type="none" w="med" len="med"/>
-                    </a:lnT>
-                  </a:tcPr>
-                </a:tc>
-                <a:tc>
-                  <a:txBody>
-                    <a:bodyPr/>
-                    <a:lstStyle/>
-                    <a:p>
-                      <a:pPr algn="ctr"/>
-                      <a:endParaRPr lang="de-DE" sz="1200" dirty="0"/>
-                    </a:p>
-                  </a:txBody>
-                  <a:tcPr>
-                    <a:lnL w="6350" cap="flat" cmpd="sng" algn="ctr">
-                      <a:solidFill>
-                        <a:schemeClr val="tx1"/>
-                      </a:solidFill>
-                      <a:prstDash val="sysDot"/>
-                      <a:round/>
-                      <a:headEnd type="none" w="med" len="med"/>
-                      <a:tailEnd type="none" w="med" len="med"/>
-                    </a:lnL>
-                    <a:lnR w="6350" cap="flat" cmpd="sng" algn="ctr">
-                      <a:solidFill>
-                        <a:schemeClr val="tx1"/>
-                      </a:solidFill>
-                      <a:prstDash val="sysDot"/>
-                      <a:round/>
-                      <a:headEnd type="none" w="med" len="med"/>
-                      <a:tailEnd type="none" w="med" len="med"/>
-                    </a:lnR>
-                    <a:lnT w="6350" cap="flat" cmpd="sng" algn="ctr">
-                      <a:solidFill>
-                        <a:schemeClr val="tx1"/>
-                      </a:solidFill>
-                      <a:prstDash val="sysDot"/>
-                      <a:round/>
-                      <a:headEnd type="none" w="med" len="med"/>
-                      <a:tailEnd type="none" w="med" len="med"/>
-                    </a:lnT>
-                  </a:tcPr>
-                </a:tc>
-                <a:tc>
-                  <a:txBody>
-                    <a:bodyPr/>
-                    <a:lstStyle/>
-                    <a:p>
-                      <a:pPr algn="ctr"/>
-                      <a:endParaRPr lang="de-DE" sz="1200" dirty="0"/>
+                      <a:pPr marL="0" marR="0" lvl="0" indent="0" algn="ctr" defTabSz="914400" rtl="0" eaLnBrk="1" fontAlgn="auto" latinLnBrk="0" hangingPunct="1">
+                        <a:lnSpc>
+                          <a:spcPct val="100000"/>
+                        </a:lnSpc>
+                        <a:spcBef>
+                          <a:spcPts val="0"/>
+                        </a:spcBef>
+                        <a:spcAft>
+                          <a:spcPts val="0"/>
+                        </a:spcAft>
+                        <a:buClrTx/>
+                        <a:buSzTx/>
+                        <a:buFontTx/>
+                        <a:buNone/>
+                        <a:tabLst/>
+                        <a:defRPr/>
+                      </a:pPr>
+                      <a:r>
+                        <a:rPr lang="de-DE" sz="1600" kern="1200" dirty="0">
+                          <a:solidFill>
+                            <a:schemeClr val="dk1"/>
+                          </a:solidFill>
+                          <a:effectLst/>
+                          <a:latin typeface="+mn-lt"/>
+                          <a:ea typeface="+mn-ea"/>
+                          <a:cs typeface="+mn-cs"/>
+                        </a:rPr>
+                        <a:t>18894,799ms (96,708%)</a:t>
+                      </a:r>
                     </a:p>
                   </a:txBody>
                   <a:tcPr>
@@ -15049,7 +14694,12 @@
             <p:ph type="title"/>
           </p:nvPr>
         </p:nvSpPr>
-        <p:spPr/>
+        <p:spPr>
+          <a:xfrm>
+            <a:off x="837478" y="480813"/>
+            <a:ext cx="10517038" cy="1285246"/>
+          </a:xfrm>
+        </p:spPr>
         <p:txBody>
           <a:bodyPr/>
           <a:lstStyle/>
@@ -15058,9 +14708,50 @@
               <a:rPr lang="de-DE" dirty="0">
                 <a:latin typeface="DM Sans" pitchFamily="2" charset="77"/>
               </a:rPr>
-              <a:t>Vergleich MiniMax und AlphaBeta</a:t>
+              <a:t>Vergleich MiniMax und </a:t>
+            </a:r>
+            <a:r>
+              <a:rPr lang="de-DE" dirty="0" err="1">
+                <a:latin typeface="DM Sans" pitchFamily="2" charset="77"/>
+              </a:rPr>
+              <a:t>AlphaBeta</a:t>
             </a:r>
             <a:endParaRPr lang="de-DE" dirty="0"/>
+          </a:p>
+        </p:txBody>
+      </p:sp>
+      <p:sp>
+        <p:nvSpPr>
+          <p:cNvPr id="3" name="Textfeld 2">
+            <a:extLst>
+              <a:ext uri="{FF2B5EF4-FFF2-40B4-BE49-F238E27FC236}">
+                <a16:creationId xmlns:a16="http://schemas.microsoft.com/office/drawing/2014/main" id="{29633D34-CB08-982C-1239-CF7CD49682B2}"/>
+              </a:ext>
+            </a:extLst>
+          </p:cNvPr>
+          <p:cNvSpPr txBox="1"/>
+          <p:nvPr/>
+        </p:nvSpPr>
+        <p:spPr>
+          <a:xfrm>
+            <a:off x="1020071" y="1549872"/>
+            <a:ext cx="2440092" cy="584775"/>
+          </a:xfrm>
+          <a:prstGeom prst="rect">
+            <a:avLst/>
+          </a:prstGeom>
+          <a:noFill/>
+        </p:spPr>
+        <p:txBody>
+          <a:bodyPr wrap="none" rtlCol="0">
+            <a:spAutoFit/>
+          </a:bodyPr>
+          <a:lstStyle/>
+          <a:p>
+            <a:r>
+              <a:rPr lang="de-DE" sz="3200" dirty="0"/>
+              <a:t>Zeitersparnis:</a:t>
+            </a:r>
           </a:p>
         </p:txBody>
       </p:sp>
@@ -15078,6 +14769,1031 @@
 </file>
 
 <file path=ppt/slides/slide7.xml><?xml version="1.0" encoding="utf-8"?>
+<p:sld xmlns:a="http://schemas.openxmlformats.org/drawingml/2006/main" xmlns:r="http://schemas.openxmlformats.org/officeDocument/2006/relationships" xmlns:p="http://schemas.openxmlformats.org/presentationml/2006/main">
+  <p:cSld>
+    <p:spTree>
+      <p:nvGrpSpPr>
+        <p:cNvPr id="1" name=""/>
+        <p:cNvGrpSpPr/>
+        <p:nvPr/>
+      </p:nvGrpSpPr>
+      <p:grpSpPr>
+        <a:xfrm>
+          <a:off x="0" y="0"/>
+          <a:ext cx="0" cy="0"/>
+          <a:chOff x="0" y="0"/>
+          <a:chExt cx="0" cy="0"/>
+        </a:xfrm>
+      </p:grpSpPr>
+      <p:graphicFrame>
+        <p:nvGraphicFramePr>
+          <p:cNvPr id="4" name="Tabelle 3">
+            <a:extLst>
+              <a:ext uri="{FF2B5EF4-FFF2-40B4-BE49-F238E27FC236}">
+                <a16:creationId xmlns:a16="http://schemas.microsoft.com/office/drawing/2014/main" id="{148D5A1F-F4C1-1627-0AF7-26B2B8EA2587}"/>
+              </a:ext>
+            </a:extLst>
+          </p:cNvPr>
+          <p:cNvGraphicFramePr>
+            <a:graphicFrameLocks noGrp="1"/>
+          </p:cNvGraphicFramePr>
+          <p:nvPr>
+            <p:extLst>
+              <p:ext uri="{D42A27DB-BD31-4B8C-83A1-F6EECF244321}">
+                <p14:modId xmlns:p14="http://schemas.microsoft.com/office/powerpoint/2010/main" val="89706768"/>
+              </p:ext>
+            </p:extLst>
+          </p:nvPr>
+        </p:nvGraphicFramePr>
+        <p:xfrm>
+          <a:off x="2200811" y="2319786"/>
+          <a:ext cx="7790372" cy="1676400"/>
+        </p:xfrm>
+        <a:graphic>
+          <a:graphicData uri="http://schemas.openxmlformats.org/drawingml/2006/table">
+            <a:tbl>
+              <a:tblPr firstRow="1" bandRow="1">
+                <a:tableStyleId>{D7AC3CCA-C797-4891-BE02-D94E43425B78}</a:tableStyleId>
+              </a:tblPr>
+              <a:tblGrid>
+                <a:gridCol w="879895">
+                  <a:extLst>
+                    <a:ext uri="{9D8B030D-6E8A-4147-A177-3AD203B41FA5}">
+                      <a16:colId xmlns:a16="http://schemas.microsoft.com/office/drawing/2014/main" val="4146284807"/>
+                    </a:ext>
+                  </a:extLst>
+                </a:gridCol>
+                <a:gridCol w="2183201">
+                  <a:extLst>
+                    <a:ext uri="{9D8B030D-6E8A-4147-A177-3AD203B41FA5}">
+                      <a16:colId xmlns:a16="http://schemas.microsoft.com/office/drawing/2014/main" val="1076281417"/>
+                    </a:ext>
+                  </a:extLst>
+                </a:gridCol>
+                <a:gridCol w="2294627">
+                  <a:extLst>
+                    <a:ext uri="{9D8B030D-6E8A-4147-A177-3AD203B41FA5}">
+                      <a16:colId xmlns:a16="http://schemas.microsoft.com/office/drawing/2014/main" val="793062181"/>
+                    </a:ext>
+                  </a:extLst>
+                </a:gridCol>
+                <a:gridCol w="2432649">
+                  <a:extLst>
+                    <a:ext uri="{9D8B030D-6E8A-4147-A177-3AD203B41FA5}">
+                      <a16:colId xmlns:a16="http://schemas.microsoft.com/office/drawing/2014/main" val="2660589754"/>
+                    </a:ext>
+                  </a:extLst>
+                </a:gridCol>
+              </a:tblGrid>
+              <a:tr h="0">
+                <a:tc rowSpan="2">
+                  <a:txBody>
+                    <a:bodyPr/>
+                    <a:lstStyle/>
+                    <a:p>
+                      <a:pPr algn="ctr"/>
+                      <a:r>
+                        <a:rPr lang="de-DE" sz="1600" dirty="0"/>
+                        <a:t>Stellung</a:t>
+                      </a:r>
+                    </a:p>
+                  </a:txBody>
+                  <a:tcPr/>
+                </a:tc>
+                <a:tc gridSpan="3">
+                  <a:txBody>
+                    <a:bodyPr/>
+                    <a:lstStyle/>
+                    <a:p>
+                      <a:pPr algn="ctr"/>
+                      <a:r>
+                        <a:rPr lang="de-DE" sz="1600" dirty="0"/>
+                        <a:t>Zugberechnungsersparnis durch Cutoff je nach Tiefe d</a:t>
+                      </a:r>
+                    </a:p>
+                  </a:txBody>
+                  <a:tcPr>
+                    <a:lnB w="6350" cap="flat" cmpd="sng" algn="ctr">
+                      <a:solidFill>
+                        <a:schemeClr val="tx1"/>
+                      </a:solidFill>
+                      <a:prstDash val="sysDot"/>
+                      <a:round/>
+                      <a:headEnd type="none" w="med" len="med"/>
+                      <a:tailEnd type="none" w="med" len="med"/>
+                    </a:lnB>
+                  </a:tcPr>
+                </a:tc>
+                <a:tc hMerge="1">
+                  <a:txBody>
+                    <a:bodyPr/>
+                    <a:lstStyle/>
+                    <a:p>
+                      <a:endParaRPr lang="de-DE"/>
+                    </a:p>
+                  </a:txBody>
+                  <a:tcPr/>
+                </a:tc>
+                <a:tc hMerge="1">
+                  <a:txBody>
+                    <a:bodyPr/>
+                    <a:lstStyle/>
+                    <a:p>
+                      <a:endParaRPr lang="de-DE"/>
+                    </a:p>
+                  </a:txBody>
+                  <a:tcPr/>
+                </a:tc>
+                <a:extLst>
+                  <a:ext uri="{0D108BD9-81ED-4DB2-BD59-A6C34878D82A}">
+                    <a16:rowId xmlns:a16="http://schemas.microsoft.com/office/drawing/2014/main" val="2337037534"/>
+                  </a:ext>
+                </a:extLst>
+              </a:tr>
+              <a:tr h="127671">
+                <a:tc vMerge="1">
+                  <a:txBody>
+                    <a:bodyPr/>
+                    <a:lstStyle/>
+                    <a:p>
+                      <a:pPr algn="ctr"/>
+                      <a:endParaRPr lang="de-DE" dirty="0"/>
+                    </a:p>
+                  </a:txBody>
+                  <a:tcPr>
+                    <a:lnT w="6350" cap="flat" cmpd="sng" algn="ctr">
+                      <a:solidFill>
+                        <a:schemeClr val="tx1"/>
+                      </a:solidFill>
+                      <a:prstDash val="sysDot"/>
+                      <a:round/>
+                      <a:headEnd type="none" w="med" len="med"/>
+                      <a:tailEnd type="none" w="med" len="med"/>
+                    </a:lnT>
+                  </a:tcPr>
+                </a:tc>
+                <a:tc>
+                  <a:txBody>
+                    <a:bodyPr/>
+                    <a:lstStyle/>
+                    <a:p>
+                      <a:pPr algn="ctr"/>
+                      <a:r>
+                        <a:rPr lang="de-DE" sz="1600" dirty="0"/>
+                        <a:t>d = 2</a:t>
+                      </a:r>
+                    </a:p>
+                  </a:txBody>
+                  <a:tcPr>
+                    <a:lnR w="6350" cap="flat" cmpd="sng" algn="ctr">
+                      <a:solidFill>
+                        <a:schemeClr val="tx1"/>
+                      </a:solidFill>
+                      <a:prstDash val="sysDot"/>
+                      <a:round/>
+                      <a:headEnd type="none" w="med" len="med"/>
+                      <a:tailEnd type="none" w="med" len="med"/>
+                    </a:lnR>
+                    <a:lnT w="6350" cap="flat" cmpd="sng" algn="ctr">
+                      <a:solidFill>
+                        <a:schemeClr val="tx1"/>
+                      </a:solidFill>
+                      <a:prstDash val="sysDot"/>
+                      <a:round/>
+                      <a:headEnd type="none" w="med" len="med"/>
+                      <a:tailEnd type="none" w="med" len="med"/>
+                    </a:lnT>
+                  </a:tcPr>
+                </a:tc>
+                <a:tc>
+                  <a:txBody>
+                    <a:bodyPr/>
+                    <a:lstStyle/>
+                    <a:p>
+                      <a:pPr algn="ctr"/>
+                      <a:r>
+                        <a:rPr lang="de-DE" sz="1600" dirty="0"/>
+                        <a:t>d = 3</a:t>
+                      </a:r>
+                    </a:p>
+                  </a:txBody>
+                  <a:tcPr>
+                    <a:lnL w="6350" cap="flat" cmpd="sng" algn="ctr">
+                      <a:solidFill>
+                        <a:schemeClr val="tx1"/>
+                      </a:solidFill>
+                      <a:prstDash val="sysDot"/>
+                      <a:round/>
+                      <a:headEnd type="none" w="med" len="med"/>
+                      <a:tailEnd type="none" w="med" len="med"/>
+                    </a:lnL>
+                    <a:lnR w="6350" cap="flat" cmpd="sng" algn="ctr">
+                      <a:solidFill>
+                        <a:schemeClr val="tx1"/>
+                      </a:solidFill>
+                      <a:prstDash val="sysDot"/>
+                      <a:round/>
+                      <a:headEnd type="none" w="med" len="med"/>
+                      <a:tailEnd type="none" w="med" len="med"/>
+                    </a:lnR>
+                    <a:lnT w="6350" cap="flat" cmpd="sng" algn="ctr">
+                      <a:solidFill>
+                        <a:schemeClr val="tx1"/>
+                      </a:solidFill>
+                      <a:prstDash val="sysDot"/>
+                      <a:round/>
+                      <a:headEnd type="none" w="med" len="med"/>
+                      <a:tailEnd type="none" w="med" len="med"/>
+                    </a:lnT>
+                  </a:tcPr>
+                </a:tc>
+                <a:tc>
+                  <a:txBody>
+                    <a:bodyPr/>
+                    <a:lstStyle/>
+                    <a:p>
+                      <a:pPr algn="ctr"/>
+                      <a:r>
+                        <a:rPr lang="de-DE" sz="1600" dirty="0"/>
+                        <a:t>d = 4</a:t>
+                      </a:r>
+                    </a:p>
+                  </a:txBody>
+                  <a:tcPr>
+                    <a:lnL w="6350" cap="flat" cmpd="sng" algn="ctr">
+                      <a:solidFill>
+                        <a:schemeClr val="tx1"/>
+                      </a:solidFill>
+                      <a:prstDash val="sysDot"/>
+                      <a:round/>
+                      <a:headEnd type="none" w="med" len="med"/>
+                      <a:tailEnd type="none" w="med" len="med"/>
+                    </a:lnL>
+                    <a:lnT w="6350" cap="flat" cmpd="sng" algn="ctr">
+                      <a:solidFill>
+                        <a:schemeClr val="tx1"/>
+                      </a:solidFill>
+                      <a:prstDash val="sysDot"/>
+                      <a:round/>
+                      <a:headEnd type="none" w="med" len="med"/>
+                      <a:tailEnd type="none" w="med" len="med"/>
+                    </a:lnT>
+                  </a:tcPr>
+                </a:tc>
+                <a:extLst>
+                  <a:ext uri="{0D108BD9-81ED-4DB2-BD59-A6C34878D82A}">
+                    <a16:rowId xmlns:a16="http://schemas.microsoft.com/office/drawing/2014/main" val="3108247156"/>
+                  </a:ext>
+                </a:extLst>
+              </a:tr>
+              <a:tr h="313779">
+                <a:tc>
+                  <a:txBody>
+                    <a:bodyPr/>
+                    <a:lstStyle/>
+                    <a:p>
+                      <a:pPr algn="ctr"/>
+                      <a:r>
+                        <a:rPr lang="de-DE" sz="1600" dirty="0"/>
+                        <a:t>1</a:t>
+                      </a:r>
+                    </a:p>
+                  </a:txBody>
+                  <a:tcPr>
+                    <a:lnB w="6350" cap="flat" cmpd="sng" algn="ctr">
+                      <a:solidFill>
+                        <a:schemeClr val="tx1"/>
+                      </a:solidFill>
+                      <a:prstDash val="sysDot"/>
+                      <a:round/>
+                      <a:headEnd type="none" w="med" len="med"/>
+                      <a:tailEnd type="none" w="med" len="med"/>
+                    </a:lnB>
+                  </a:tcPr>
+                </a:tc>
+                <a:tc>
+                  <a:txBody>
+                    <a:bodyPr/>
+                    <a:lstStyle/>
+                    <a:p>
+                      <a:pPr algn="ctr"/>
+                      <a:r>
+                        <a:rPr lang="de-DE" sz="1600" kern="1200" dirty="0">
+                          <a:solidFill>
+                            <a:schemeClr val="dk1"/>
+                          </a:solidFill>
+                          <a:effectLst/>
+                          <a:latin typeface="+mn-lt"/>
+                          <a:ea typeface="+mn-ea"/>
+                          <a:cs typeface="+mn-cs"/>
+                        </a:rPr>
+                        <a:t>207 (56,250%)</a:t>
+                      </a:r>
+                    </a:p>
+                  </a:txBody>
+                  <a:tcPr>
+                    <a:lnR w="6350" cap="flat" cmpd="sng" algn="ctr">
+                      <a:solidFill>
+                        <a:schemeClr val="tx1"/>
+                      </a:solidFill>
+                      <a:prstDash val="sysDot"/>
+                      <a:round/>
+                      <a:headEnd type="none" w="med" len="med"/>
+                      <a:tailEnd type="none" w="med" len="med"/>
+                    </a:lnR>
+                    <a:lnB w="6350" cap="flat" cmpd="sng" algn="ctr">
+                      <a:solidFill>
+                        <a:schemeClr val="tx1"/>
+                      </a:solidFill>
+                      <a:prstDash val="sysDot"/>
+                      <a:round/>
+                      <a:headEnd type="none" w="med" len="med"/>
+                      <a:tailEnd type="none" w="med" len="med"/>
+                    </a:lnB>
+                  </a:tcPr>
+                </a:tc>
+                <a:tc>
+                  <a:txBody>
+                    <a:bodyPr/>
+                    <a:lstStyle/>
+                    <a:p>
+                      <a:pPr marL="0" marR="0" lvl="0" indent="0" algn="ctr" defTabSz="914400" rtl="0" eaLnBrk="1" fontAlgn="auto" latinLnBrk="0" hangingPunct="1">
+                        <a:lnSpc>
+                          <a:spcPct val="100000"/>
+                        </a:lnSpc>
+                        <a:spcBef>
+                          <a:spcPts val="0"/>
+                        </a:spcBef>
+                        <a:spcAft>
+                          <a:spcPts val="0"/>
+                        </a:spcAft>
+                        <a:buClrTx/>
+                        <a:buSzTx/>
+                        <a:buFontTx/>
+                        <a:buNone/>
+                        <a:tabLst/>
+                        <a:defRPr/>
+                      </a:pPr>
+                      <a:r>
+                        <a:rPr lang="de-DE" sz="1600" kern="1200" dirty="0">
+                          <a:solidFill>
+                            <a:schemeClr val="dk1"/>
+                          </a:solidFill>
+                          <a:effectLst/>
+                          <a:latin typeface="+mn-lt"/>
+                          <a:ea typeface="+mn-ea"/>
+                          <a:cs typeface="+mn-cs"/>
+                        </a:rPr>
+                        <a:t>4781 (87,500%)</a:t>
+                      </a:r>
+                    </a:p>
+                  </a:txBody>
+                  <a:tcPr>
+                    <a:lnL w="6350" cap="flat" cmpd="sng" algn="ctr">
+                      <a:solidFill>
+                        <a:schemeClr val="tx1"/>
+                      </a:solidFill>
+                      <a:prstDash val="sysDot"/>
+                      <a:round/>
+                      <a:headEnd type="none" w="med" len="med"/>
+                      <a:tailEnd type="none" w="med" len="med"/>
+                    </a:lnL>
+                    <a:lnR w="6350" cap="flat" cmpd="sng" algn="ctr">
+                      <a:solidFill>
+                        <a:schemeClr val="tx1"/>
+                      </a:solidFill>
+                      <a:prstDash val="sysDot"/>
+                      <a:round/>
+                      <a:headEnd type="none" w="med" len="med"/>
+                      <a:tailEnd type="none" w="med" len="med"/>
+                    </a:lnR>
+                    <a:lnB w="6350" cap="flat" cmpd="sng" algn="ctr">
+                      <a:solidFill>
+                        <a:schemeClr val="tx1"/>
+                      </a:solidFill>
+                      <a:prstDash val="sysDot"/>
+                      <a:round/>
+                      <a:headEnd type="none" w="med" len="med"/>
+                      <a:tailEnd type="none" w="med" len="med"/>
+                    </a:lnB>
+                  </a:tcPr>
+                </a:tc>
+                <a:tc>
+                  <a:txBody>
+                    <a:bodyPr/>
+                    <a:lstStyle/>
+                    <a:p>
+                      <a:pPr marL="0" marR="0" lvl="0" indent="0" algn="ctr" defTabSz="914400" rtl="0" eaLnBrk="1" fontAlgn="auto" latinLnBrk="0" hangingPunct="1">
+                        <a:lnSpc>
+                          <a:spcPct val="100000"/>
+                        </a:lnSpc>
+                        <a:spcBef>
+                          <a:spcPts val="0"/>
+                        </a:spcBef>
+                        <a:spcAft>
+                          <a:spcPts val="0"/>
+                        </a:spcAft>
+                        <a:buClrTx/>
+                        <a:buSzTx/>
+                        <a:buFontTx/>
+                        <a:buNone/>
+                        <a:tabLst/>
+                        <a:defRPr/>
+                      </a:pPr>
+                      <a:r>
+                        <a:rPr lang="de-DE" sz="1600" kern="1200" dirty="0">
+                          <a:solidFill>
+                            <a:schemeClr val="dk1"/>
+                          </a:solidFill>
+                          <a:effectLst/>
+                          <a:latin typeface="+mn-lt"/>
+                          <a:ea typeface="+mn-ea"/>
+                          <a:cs typeface="+mn-cs"/>
+                        </a:rPr>
+                        <a:t>87997 (86,251%)</a:t>
+                      </a:r>
+                    </a:p>
+                  </a:txBody>
+                  <a:tcPr>
+                    <a:lnL w="6350" cap="flat" cmpd="sng" algn="ctr">
+                      <a:solidFill>
+                        <a:schemeClr val="tx1"/>
+                      </a:solidFill>
+                      <a:prstDash val="sysDot"/>
+                      <a:round/>
+                      <a:headEnd type="none" w="med" len="med"/>
+                      <a:tailEnd type="none" w="med" len="med"/>
+                    </a:lnL>
+                    <a:lnB w="6350" cap="flat" cmpd="sng" algn="ctr">
+                      <a:solidFill>
+                        <a:schemeClr val="tx1"/>
+                      </a:solidFill>
+                      <a:prstDash val="sysDot"/>
+                      <a:round/>
+                      <a:headEnd type="none" w="med" len="med"/>
+                      <a:tailEnd type="none" w="med" len="med"/>
+                    </a:lnB>
+                  </a:tcPr>
+                </a:tc>
+                <a:extLst>
+                  <a:ext uri="{0D108BD9-81ED-4DB2-BD59-A6C34878D82A}">
+                    <a16:rowId xmlns:a16="http://schemas.microsoft.com/office/drawing/2014/main" val="4251234231"/>
+                  </a:ext>
+                </a:extLst>
+              </a:tr>
+              <a:tr h="280975">
+                <a:tc>
+                  <a:txBody>
+                    <a:bodyPr/>
+                    <a:lstStyle/>
+                    <a:p>
+                      <a:pPr algn="ctr"/>
+                      <a:r>
+                        <a:rPr lang="de-DE" sz="1600" dirty="0"/>
+                        <a:t>2</a:t>
+                      </a:r>
+                    </a:p>
+                  </a:txBody>
+                  <a:tcPr>
+                    <a:lnT w="6350" cap="flat" cmpd="sng" algn="ctr">
+                      <a:solidFill>
+                        <a:schemeClr val="tx1"/>
+                      </a:solidFill>
+                      <a:prstDash val="sysDot"/>
+                      <a:round/>
+                      <a:headEnd type="none" w="med" len="med"/>
+                      <a:tailEnd type="none" w="med" len="med"/>
+                    </a:lnT>
+                    <a:lnB w="6350" cap="flat" cmpd="sng" algn="ctr">
+                      <a:solidFill>
+                        <a:schemeClr val="tx1"/>
+                      </a:solidFill>
+                      <a:prstDash val="sysDot"/>
+                      <a:round/>
+                      <a:headEnd type="none" w="med" len="med"/>
+                      <a:tailEnd type="none" w="med" len="med"/>
+                    </a:lnB>
+                  </a:tcPr>
+                </a:tc>
+                <a:tc>
+                  <a:txBody>
+                    <a:bodyPr/>
+                    <a:lstStyle/>
+                    <a:p>
+                      <a:pPr marL="0" marR="0" lvl="0" indent="0" algn="ctr" defTabSz="914400" rtl="0" eaLnBrk="1" fontAlgn="auto" latinLnBrk="0" hangingPunct="1">
+                        <a:lnSpc>
+                          <a:spcPct val="100000"/>
+                        </a:lnSpc>
+                        <a:spcBef>
+                          <a:spcPts val="0"/>
+                        </a:spcBef>
+                        <a:spcAft>
+                          <a:spcPts val="0"/>
+                        </a:spcAft>
+                        <a:buClrTx/>
+                        <a:buSzTx/>
+                        <a:buFontTx/>
+                        <a:buNone/>
+                        <a:tabLst/>
+                        <a:defRPr/>
+                      </a:pPr>
+                      <a:r>
+                        <a:rPr lang="de-DE" sz="1600" kern="1200" dirty="0">
+                          <a:solidFill>
+                            <a:schemeClr val="dk1"/>
+                          </a:solidFill>
+                          <a:effectLst/>
+                          <a:latin typeface="+mn-lt"/>
+                          <a:ea typeface="+mn-ea"/>
+                          <a:cs typeface="+mn-cs"/>
+                        </a:rPr>
+                        <a:t>932 (61,075%)</a:t>
+                      </a:r>
+                    </a:p>
+                  </a:txBody>
+                  <a:tcPr>
+                    <a:lnR w="6350" cap="flat" cmpd="sng" algn="ctr">
+                      <a:solidFill>
+                        <a:schemeClr val="tx1"/>
+                      </a:solidFill>
+                      <a:prstDash val="sysDot"/>
+                      <a:round/>
+                      <a:headEnd type="none" w="med" len="med"/>
+                      <a:tailEnd type="none" w="med" len="med"/>
+                    </a:lnR>
+                    <a:lnT w="6350" cap="flat" cmpd="sng" algn="ctr">
+                      <a:solidFill>
+                        <a:schemeClr val="tx1"/>
+                      </a:solidFill>
+                      <a:prstDash val="sysDot"/>
+                      <a:round/>
+                      <a:headEnd type="none" w="med" len="med"/>
+                      <a:tailEnd type="none" w="med" len="med"/>
+                    </a:lnT>
+                    <a:lnB w="6350" cap="flat" cmpd="sng" algn="ctr">
+                      <a:solidFill>
+                        <a:schemeClr val="tx1"/>
+                      </a:solidFill>
+                      <a:prstDash val="sysDot"/>
+                      <a:round/>
+                      <a:headEnd type="none" w="med" len="med"/>
+                      <a:tailEnd type="none" w="med" len="med"/>
+                    </a:lnB>
+                  </a:tcPr>
+                </a:tc>
+                <a:tc>
+                  <a:txBody>
+                    <a:bodyPr/>
+                    <a:lstStyle/>
+                    <a:p>
+                      <a:pPr marL="0" marR="0" lvl="0" indent="0" algn="ctr" defTabSz="914400" rtl="0" eaLnBrk="1" fontAlgn="auto" latinLnBrk="0" hangingPunct="1">
+                        <a:lnSpc>
+                          <a:spcPct val="100000"/>
+                        </a:lnSpc>
+                        <a:spcBef>
+                          <a:spcPts val="0"/>
+                        </a:spcBef>
+                        <a:spcAft>
+                          <a:spcPts val="0"/>
+                        </a:spcAft>
+                        <a:buClrTx/>
+                        <a:buSzTx/>
+                        <a:buFontTx/>
+                        <a:buNone/>
+                        <a:tabLst/>
+                        <a:defRPr/>
+                      </a:pPr>
+                      <a:r>
+                        <a:rPr lang="de-DE" sz="1600" kern="1200" dirty="0">
+                          <a:solidFill>
+                            <a:schemeClr val="dk1"/>
+                          </a:solidFill>
+                          <a:effectLst/>
+                          <a:latin typeface="+mn-lt"/>
+                          <a:ea typeface="+mn-ea"/>
+                          <a:cs typeface="+mn-cs"/>
+                        </a:rPr>
+                        <a:t>39566 (68,185%)</a:t>
+                      </a:r>
+                    </a:p>
+                  </a:txBody>
+                  <a:tcPr>
+                    <a:lnL w="6350" cap="flat" cmpd="sng" algn="ctr">
+                      <a:solidFill>
+                        <a:schemeClr val="tx1"/>
+                      </a:solidFill>
+                      <a:prstDash val="sysDot"/>
+                      <a:round/>
+                      <a:headEnd type="none" w="med" len="med"/>
+                      <a:tailEnd type="none" w="med" len="med"/>
+                    </a:lnL>
+                    <a:lnR w="6350" cap="flat" cmpd="sng" algn="ctr">
+                      <a:solidFill>
+                        <a:schemeClr val="tx1"/>
+                      </a:solidFill>
+                      <a:prstDash val="sysDot"/>
+                      <a:round/>
+                      <a:headEnd type="none" w="med" len="med"/>
+                      <a:tailEnd type="none" w="med" len="med"/>
+                    </a:lnR>
+                    <a:lnT w="6350" cap="flat" cmpd="sng" algn="ctr">
+                      <a:solidFill>
+                        <a:schemeClr val="tx1"/>
+                      </a:solidFill>
+                      <a:prstDash val="sysDot"/>
+                      <a:round/>
+                      <a:headEnd type="none" w="med" len="med"/>
+                      <a:tailEnd type="none" w="med" len="med"/>
+                    </a:lnT>
+                    <a:lnB w="6350" cap="flat" cmpd="sng" algn="ctr">
+                      <a:solidFill>
+                        <a:schemeClr val="tx1"/>
+                      </a:solidFill>
+                      <a:prstDash val="sysDot"/>
+                      <a:round/>
+                      <a:headEnd type="none" w="med" len="med"/>
+                      <a:tailEnd type="none" w="med" len="med"/>
+                    </a:lnB>
+                  </a:tcPr>
+                </a:tc>
+                <a:tc>
+                  <a:txBody>
+                    <a:bodyPr/>
+                    <a:lstStyle/>
+                    <a:p>
+                      <a:pPr marL="0" marR="0" lvl="0" indent="0" algn="ctr" defTabSz="914400" rtl="0" eaLnBrk="1" fontAlgn="auto" latinLnBrk="0" hangingPunct="1">
+                        <a:lnSpc>
+                          <a:spcPct val="100000"/>
+                        </a:lnSpc>
+                        <a:spcBef>
+                          <a:spcPts val="0"/>
+                        </a:spcBef>
+                        <a:spcAft>
+                          <a:spcPts val="0"/>
+                        </a:spcAft>
+                        <a:buClrTx/>
+                        <a:buSzTx/>
+                        <a:buFontTx/>
+                        <a:buNone/>
+                        <a:tabLst/>
+                        <a:defRPr/>
+                      </a:pPr>
+                      <a:r>
+                        <a:rPr lang="de-DE" sz="1600" kern="1200" dirty="0">
+                          <a:solidFill>
+                            <a:schemeClr val="dk1"/>
+                          </a:solidFill>
+                          <a:effectLst/>
+                          <a:latin typeface="+mn-lt"/>
+                          <a:ea typeface="+mn-ea"/>
+                          <a:cs typeface="+mn-cs"/>
+                        </a:rPr>
+                        <a:t>1872077 (84,640%)</a:t>
+                      </a:r>
+                    </a:p>
+                  </a:txBody>
+                  <a:tcPr>
+                    <a:lnL w="6350" cap="flat" cmpd="sng" algn="ctr">
+                      <a:solidFill>
+                        <a:schemeClr val="tx1"/>
+                      </a:solidFill>
+                      <a:prstDash val="sysDot"/>
+                      <a:round/>
+                      <a:headEnd type="none" w="med" len="med"/>
+                      <a:tailEnd type="none" w="med" len="med"/>
+                    </a:lnL>
+                    <a:lnT w="6350" cap="flat" cmpd="sng" algn="ctr">
+                      <a:solidFill>
+                        <a:schemeClr val="tx1"/>
+                      </a:solidFill>
+                      <a:prstDash val="sysDot"/>
+                      <a:round/>
+                      <a:headEnd type="none" w="med" len="med"/>
+                      <a:tailEnd type="none" w="med" len="med"/>
+                    </a:lnT>
+                    <a:lnB w="6350" cap="flat" cmpd="sng" algn="ctr">
+                      <a:solidFill>
+                        <a:schemeClr val="tx1"/>
+                      </a:solidFill>
+                      <a:prstDash val="sysDot"/>
+                      <a:round/>
+                      <a:headEnd type="none" w="med" len="med"/>
+                      <a:tailEnd type="none" w="med" len="med"/>
+                    </a:lnB>
+                  </a:tcPr>
+                </a:tc>
+                <a:extLst>
+                  <a:ext uri="{0D108BD9-81ED-4DB2-BD59-A6C34878D82A}">
+                    <a16:rowId xmlns:a16="http://schemas.microsoft.com/office/drawing/2014/main" val="2361342053"/>
+                  </a:ext>
+                </a:extLst>
+              </a:tr>
+              <a:tr h="280975">
+                <a:tc>
+                  <a:txBody>
+                    <a:bodyPr/>
+                    <a:lstStyle/>
+                    <a:p>
+                      <a:pPr algn="ctr"/>
+                      <a:r>
+                        <a:rPr lang="de-DE" sz="1600" dirty="0"/>
+                        <a:t>3</a:t>
+                      </a:r>
+                    </a:p>
+                  </a:txBody>
+                  <a:tcPr>
+                    <a:lnT w="6350" cap="flat" cmpd="sng" algn="ctr">
+                      <a:solidFill>
+                        <a:schemeClr val="tx1"/>
+                      </a:solidFill>
+                      <a:prstDash val="sysDot"/>
+                      <a:round/>
+                      <a:headEnd type="none" w="med" len="med"/>
+                      <a:tailEnd type="none" w="med" len="med"/>
+                    </a:lnT>
+                  </a:tcPr>
+                </a:tc>
+                <a:tc>
+                  <a:txBody>
+                    <a:bodyPr/>
+                    <a:lstStyle/>
+                    <a:p>
+                      <a:pPr marL="0" marR="0" lvl="0" indent="0" algn="ctr" defTabSz="914400" rtl="0" eaLnBrk="1" fontAlgn="auto" latinLnBrk="0" hangingPunct="1">
+                        <a:lnSpc>
+                          <a:spcPct val="100000"/>
+                        </a:lnSpc>
+                        <a:spcBef>
+                          <a:spcPts val="0"/>
+                        </a:spcBef>
+                        <a:spcAft>
+                          <a:spcPts val="0"/>
+                        </a:spcAft>
+                        <a:buClrTx/>
+                        <a:buSzTx/>
+                        <a:buFontTx/>
+                        <a:buNone/>
+                        <a:tabLst/>
+                        <a:defRPr/>
+                      </a:pPr>
+                      <a:r>
+                        <a:rPr lang="de-DE" sz="1600" kern="1200" dirty="0">
+                          <a:solidFill>
+                            <a:schemeClr val="dk1"/>
+                          </a:solidFill>
+                          <a:effectLst/>
+                          <a:latin typeface="+mn-lt"/>
+                          <a:ea typeface="+mn-ea"/>
+                          <a:cs typeface="+mn-cs"/>
+                        </a:rPr>
+                        <a:t>759 (77,056%)</a:t>
+                      </a:r>
+                    </a:p>
+                  </a:txBody>
+                  <a:tcPr>
+                    <a:lnR w="6350" cap="flat" cmpd="sng" algn="ctr">
+                      <a:solidFill>
+                        <a:schemeClr val="tx1"/>
+                      </a:solidFill>
+                      <a:prstDash val="sysDot"/>
+                      <a:round/>
+                      <a:headEnd type="none" w="med" len="med"/>
+                      <a:tailEnd type="none" w="med" len="med"/>
+                    </a:lnR>
+                    <a:lnT w="6350" cap="flat" cmpd="sng" algn="ctr">
+                      <a:solidFill>
+                        <a:schemeClr val="tx1"/>
+                      </a:solidFill>
+                      <a:prstDash val="sysDot"/>
+                      <a:round/>
+                      <a:headEnd type="none" w="med" len="med"/>
+                      <a:tailEnd type="none" w="med" len="med"/>
+                    </a:lnT>
+                  </a:tcPr>
+                </a:tc>
+                <a:tc>
+                  <a:txBody>
+                    <a:bodyPr/>
+                    <a:lstStyle/>
+                    <a:p>
+                      <a:pPr marL="0" marR="0" lvl="0" indent="0" algn="ctr" defTabSz="914400" rtl="0" eaLnBrk="1" fontAlgn="auto" latinLnBrk="0" hangingPunct="1">
+                        <a:lnSpc>
+                          <a:spcPct val="100000"/>
+                        </a:lnSpc>
+                        <a:spcBef>
+                          <a:spcPts val="0"/>
+                        </a:spcBef>
+                        <a:spcAft>
+                          <a:spcPts val="0"/>
+                        </a:spcAft>
+                        <a:buClrTx/>
+                        <a:buSzTx/>
+                        <a:buFontTx/>
+                        <a:buNone/>
+                        <a:tabLst/>
+                        <a:defRPr/>
+                      </a:pPr>
+                      <a:r>
+                        <a:rPr lang="de-DE" sz="1600" kern="1200" dirty="0">
+                          <a:solidFill>
+                            <a:schemeClr val="dk1"/>
+                          </a:solidFill>
+                          <a:effectLst/>
+                          <a:latin typeface="+mn-lt"/>
+                          <a:ea typeface="+mn-ea"/>
+                          <a:cs typeface="+mn-cs"/>
+                        </a:rPr>
+                        <a:t>29147 (87,925%)</a:t>
+                      </a:r>
+                    </a:p>
+                  </a:txBody>
+                  <a:tcPr>
+                    <a:lnL w="6350" cap="flat" cmpd="sng" algn="ctr">
+                      <a:solidFill>
+                        <a:schemeClr val="tx1"/>
+                      </a:solidFill>
+                      <a:prstDash val="sysDot"/>
+                      <a:round/>
+                      <a:headEnd type="none" w="med" len="med"/>
+                      <a:tailEnd type="none" w="med" len="med"/>
+                    </a:lnL>
+                    <a:lnR w="6350" cap="flat" cmpd="sng" algn="ctr">
+                      <a:solidFill>
+                        <a:schemeClr val="tx1"/>
+                      </a:solidFill>
+                      <a:prstDash val="sysDot"/>
+                      <a:round/>
+                      <a:headEnd type="none" w="med" len="med"/>
+                      <a:tailEnd type="none" w="med" len="med"/>
+                    </a:lnR>
+                    <a:lnT w="6350" cap="flat" cmpd="sng" algn="ctr">
+                      <a:solidFill>
+                        <a:schemeClr val="tx1"/>
+                      </a:solidFill>
+                      <a:prstDash val="sysDot"/>
+                      <a:round/>
+                      <a:headEnd type="none" w="med" len="med"/>
+                      <a:tailEnd type="none" w="med" len="med"/>
+                    </a:lnT>
+                  </a:tcPr>
+                </a:tc>
+                <a:tc>
+                  <a:txBody>
+                    <a:bodyPr/>
+                    <a:lstStyle/>
+                    <a:p>
+                      <a:pPr marL="0" marR="0" lvl="0" indent="0" algn="ctr" defTabSz="914400" rtl="0" eaLnBrk="1" fontAlgn="auto" latinLnBrk="0" hangingPunct="1">
+                        <a:lnSpc>
+                          <a:spcPct val="100000"/>
+                        </a:lnSpc>
+                        <a:spcBef>
+                          <a:spcPts val="0"/>
+                        </a:spcBef>
+                        <a:spcAft>
+                          <a:spcPts val="0"/>
+                        </a:spcAft>
+                        <a:buClrTx/>
+                        <a:buSzTx/>
+                        <a:buFontTx/>
+                        <a:buNone/>
+                        <a:tabLst/>
+                        <a:defRPr/>
+                      </a:pPr>
+                      <a:r>
+                        <a:rPr lang="de-DE" sz="1600" kern="1200" dirty="0">
+                          <a:solidFill>
+                            <a:schemeClr val="dk1"/>
+                          </a:solidFill>
+                          <a:effectLst/>
+                          <a:latin typeface="+mn-lt"/>
+                          <a:ea typeface="+mn-ea"/>
+                          <a:cs typeface="+mn-cs"/>
+                        </a:rPr>
+                        <a:t>997652 (96,320%)</a:t>
+                      </a:r>
+                    </a:p>
+                  </a:txBody>
+                  <a:tcPr>
+                    <a:lnL w="6350" cap="flat" cmpd="sng" algn="ctr">
+                      <a:solidFill>
+                        <a:schemeClr val="tx1"/>
+                      </a:solidFill>
+                      <a:prstDash val="sysDot"/>
+                      <a:round/>
+                      <a:headEnd type="none" w="med" len="med"/>
+                      <a:tailEnd type="none" w="med" len="med"/>
+                    </a:lnL>
+                    <a:lnT w="6350" cap="flat" cmpd="sng" algn="ctr">
+                      <a:solidFill>
+                        <a:schemeClr val="tx1"/>
+                      </a:solidFill>
+                      <a:prstDash val="sysDot"/>
+                      <a:round/>
+                      <a:headEnd type="none" w="med" len="med"/>
+                      <a:tailEnd type="none" w="med" len="med"/>
+                    </a:lnT>
+                  </a:tcPr>
+                </a:tc>
+                <a:extLst>
+                  <a:ext uri="{0D108BD9-81ED-4DB2-BD59-A6C34878D82A}">
+                    <a16:rowId xmlns:a16="http://schemas.microsoft.com/office/drawing/2014/main" val="549518868"/>
+                  </a:ext>
+                </a:extLst>
+              </a:tr>
+            </a:tbl>
+          </a:graphicData>
+        </a:graphic>
+      </p:graphicFrame>
+      <p:sp>
+        <p:nvSpPr>
+          <p:cNvPr id="5" name="Titel 7">
+            <a:extLst>
+              <a:ext uri="{FF2B5EF4-FFF2-40B4-BE49-F238E27FC236}">
+                <a16:creationId xmlns:a16="http://schemas.microsoft.com/office/drawing/2014/main" id="{76937463-63A0-A38C-EE21-1CADBB4723C8}"/>
+              </a:ext>
+            </a:extLst>
+          </p:cNvPr>
+          <p:cNvSpPr>
+            <a:spLocks noGrp="1"/>
+          </p:cNvSpPr>
+          <p:nvPr>
+            <p:ph type="title"/>
+          </p:nvPr>
+        </p:nvSpPr>
+        <p:spPr>
+          <a:xfrm>
+            <a:off x="837478" y="480813"/>
+            <a:ext cx="10517038" cy="1285246"/>
+          </a:xfrm>
+        </p:spPr>
+        <p:txBody>
+          <a:bodyPr/>
+          <a:lstStyle/>
+          <a:p>
+            <a:r>
+              <a:rPr lang="de-DE" dirty="0">
+                <a:latin typeface="DM Sans" pitchFamily="2" charset="77"/>
+              </a:rPr>
+              <a:t>Vergleich MiniMax und </a:t>
+            </a:r>
+            <a:r>
+              <a:rPr lang="de-DE" dirty="0" err="1">
+                <a:latin typeface="DM Sans" pitchFamily="2" charset="77"/>
+              </a:rPr>
+              <a:t>AlphaBeta</a:t>
+            </a:r>
+            <a:endParaRPr lang="de-DE" dirty="0"/>
+          </a:p>
+        </p:txBody>
+      </p:sp>
+      <p:sp>
+        <p:nvSpPr>
+          <p:cNvPr id="6" name="Textfeld 5">
+            <a:extLst>
+              <a:ext uri="{FF2B5EF4-FFF2-40B4-BE49-F238E27FC236}">
+                <a16:creationId xmlns:a16="http://schemas.microsoft.com/office/drawing/2014/main" id="{03254B65-C8F3-CD58-9BA5-4B9C4927BF2B}"/>
+              </a:ext>
+            </a:extLst>
+          </p:cNvPr>
+          <p:cNvSpPr txBox="1"/>
+          <p:nvPr/>
+        </p:nvSpPr>
+        <p:spPr>
+          <a:xfrm>
+            <a:off x="1020071" y="1549872"/>
+            <a:ext cx="4578946" cy="584775"/>
+          </a:xfrm>
+          <a:prstGeom prst="rect">
+            <a:avLst/>
+          </a:prstGeom>
+          <a:noFill/>
+        </p:spPr>
+        <p:txBody>
+          <a:bodyPr wrap="none" rtlCol="0">
+            <a:spAutoFit/>
+          </a:bodyPr>
+          <a:lstStyle/>
+          <a:p>
+            <a:r>
+              <a:rPr lang="de-DE" sz="3200" dirty="0"/>
+              <a:t>Zugberechnungsersparnis:</a:t>
+            </a:r>
+          </a:p>
+        </p:txBody>
+      </p:sp>
+    </p:spTree>
+    <p:extLst>
+      <p:ext uri="{BB962C8B-B14F-4D97-AF65-F5344CB8AC3E}">
+        <p14:creationId xmlns:p14="http://schemas.microsoft.com/office/powerpoint/2010/main" val="743446416"/>
+      </p:ext>
+    </p:extLst>
+  </p:cSld>
+  <p:clrMapOvr>
+    <a:masterClrMapping/>
+  </p:clrMapOvr>
+</p:sld>
+</file>
+
+<file path=ppt/slides/slide8.xml><?xml version="1.0" encoding="utf-8"?>
 <p:sld xmlns:a="http://schemas.openxmlformats.org/drawingml/2006/main" xmlns:r="http://schemas.openxmlformats.org/officeDocument/2006/relationships" xmlns:p="http://schemas.openxmlformats.org/presentationml/2006/main">
   <p:cSld>
     <p:spTree>

</xml_diff>